<commit_message>
Amerhst Security Group Presentation 2025-04-17
</commit_message>
<xml_diff>
--- a/2025-0417-OWASP-AMHERST-EUCRA-OVERVIEW.pptx
+++ b/2025-0417-OWASP-AMHERST-EUCRA-OVERVIEW.pptx
@@ -211,7 +211,7 @@
           <a:p>
             <a:fld id="{332E4851-9EEE-4C44-B0F3-632DB06B8768}" type="datetimeFigureOut">
               <a:rPr lang="en-US" smtClean="0"/>
-              <a:t>4/16/2025</a:t>
+              <a:t>4/17/2025</a:t>
             </a:fld>
             <a:endParaRPr lang="en-US"/>
           </a:p>
@@ -528,7 +528,7 @@
           <a:noFill/>
           <a:extLst>
             <a:ext uri="{909E8E84-426E-40dd-AFC4-6F175D3DCCD1}">
-              <a14:hiddenFill xmlns="" xmlns:a14="http://schemas.microsoft.com/office/drawing/2010/main">
+              <a14:hiddenFill xmlns:a14="http://schemas.microsoft.com/office/drawing/2010/main" xmlns="">
                 <a:solidFill>
                   <a:srgbClr val="FFFFFF"/>
                 </a:solidFill>
@@ -588,7 +588,7 @@
             </a:ln>
             <a:extLst>
               <a:ext uri="{91240B29-F687-4f45-9708-019B960494DF}">
-                <a14:hiddenLine xmlns="" xmlns:a14="http://schemas.microsoft.com/office/drawing/2010/main" w="9525">
+                <a14:hiddenLine xmlns:a14="http://schemas.microsoft.com/office/drawing/2010/main" xmlns="" w="9525">
                   <a:solidFill>
                     <a:srgbClr val="000000"/>
                   </a:solidFill>
@@ -678,7 +678,7 @@
             </a:ln>
             <a:extLst>
               <a:ext uri="{91240B29-F687-4f45-9708-019B960494DF}">
-                <a14:hiddenLine xmlns="" xmlns:a14="http://schemas.microsoft.com/office/drawing/2010/main" w="9525">
+                <a14:hiddenLine xmlns:a14="http://schemas.microsoft.com/office/drawing/2010/main" xmlns="" w="9525">
                   <a:solidFill>
                     <a:srgbClr val="000000"/>
                   </a:solidFill>
@@ -768,7 +768,7 @@
             </a:ln>
             <a:extLst>
               <a:ext uri="{91240B29-F687-4f45-9708-019B960494DF}">
-                <a14:hiddenLine xmlns="" xmlns:a14="http://schemas.microsoft.com/office/drawing/2010/main" w="9525">
+                <a14:hiddenLine xmlns:a14="http://schemas.microsoft.com/office/drawing/2010/main" xmlns="" w="9525">
                   <a:solidFill>
                     <a:srgbClr val="000000"/>
                   </a:solidFill>
@@ -802,7 +802,7 @@
             </a:ln>
             <a:extLst>
               <a:ext uri="{91240B29-F687-4f45-9708-019B960494DF}">
-                <a14:hiddenLine xmlns="" xmlns:a14="http://schemas.microsoft.com/office/drawing/2010/main" w="9525">
+                <a14:hiddenLine xmlns:a14="http://schemas.microsoft.com/office/drawing/2010/main" xmlns="" w="9525">
                   <a:solidFill>
                     <a:srgbClr val="000000"/>
                   </a:solidFill>
@@ -892,7 +892,7 @@
             </a:ln>
             <a:extLst>
               <a:ext uri="{91240B29-F687-4f45-9708-019B960494DF}">
-                <a14:hiddenLine xmlns="" xmlns:a14="http://schemas.microsoft.com/office/drawing/2010/main" w="9525">
+                <a14:hiddenLine xmlns:a14="http://schemas.microsoft.com/office/drawing/2010/main" xmlns="" w="9525">
                   <a:solidFill>
                     <a:srgbClr val="000000"/>
                   </a:solidFill>
@@ -954,7 +954,7 @@
             </a:ln>
             <a:extLst>
               <a:ext uri="{91240B29-F687-4f45-9708-019B960494DF}">
-                <a14:hiddenLine xmlns="" xmlns:a14="http://schemas.microsoft.com/office/drawing/2010/main" w="9525">
+                <a14:hiddenLine xmlns:a14="http://schemas.microsoft.com/office/drawing/2010/main" xmlns="" w="9525">
                   <a:solidFill>
                     <a:srgbClr val="000000"/>
                   </a:solidFill>
@@ -1016,7 +1016,7 @@
             </a:ln>
             <a:extLst>
               <a:ext uri="{91240B29-F687-4f45-9708-019B960494DF}">
-                <a14:hiddenLine xmlns="" xmlns:a14="http://schemas.microsoft.com/office/drawing/2010/main" w="9525">
+                <a14:hiddenLine xmlns:a14="http://schemas.microsoft.com/office/drawing/2010/main" xmlns="" w="9525">
                   <a:solidFill>
                     <a:srgbClr val="000000"/>
                   </a:solidFill>
@@ -1106,7 +1106,7 @@
             </a:ln>
             <a:extLst>
               <a:ext uri="{91240B29-F687-4f45-9708-019B960494DF}">
-                <a14:hiddenLine xmlns="" xmlns:a14="http://schemas.microsoft.com/office/drawing/2010/main" w="9525">
+                <a14:hiddenLine xmlns:a14="http://schemas.microsoft.com/office/drawing/2010/main" xmlns="" w="9525">
                   <a:solidFill>
                     <a:srgbClr val="000000"/>
                   </a:solidFill>
@@ -1168,7 +1168,7 @@
             </a:ln>
             <a:extLst>
               <a:ext uri="{91240B29-F687-4f45-9708-019B960494DF}">
-                <a14:hiddenLine xmlns="" xmlns:a14="http://schemas.microsoft.com/office/drawing/2010/main" w="9525">
+                <a14:hiddenLine xmlns:a14="http://schemas.microsoft.com/office/drawing/2010/main" xmlns="" w="9525">
                   <a:solidFill>
                     <a:srgbClr val="000000"/>
                   </a:solidFill>
@@ -1230,7 +1230,7 @@
             </a:ln>
             <a:extLst>
               <a:ext uri="{91240B29-F687-4f45-9708-019B960494DF}">
-                <a14:hiddenLine xmlns="" xmlns:a14="http://schemas.microsoft.com/office/drawing/2010/main" w="9525">
+                <a14:hiddenLine xmlns:a14="http://schemas.microsoft.com/office/drawing/2010/main" xmlns="" w="9525">
                   <a:solidFill>
                     <a:srgbClr val="000000"/>
                   </a:solidFill>
@@ -1320,7 +1320,7 @@
             </a:ln>
             <a:extLst>
               <a:ext uri="{91240B29-F687-4f45-9708-019B960494DF}">
-                <a14:hiddenLine xmlns="" xmlns:a14="http://schemas.microsoft.com/office/drawing/2010/main" w="9525">
+                <a14:hiddenLine xmlns:a14="http://schemas.microsoft.com/office/drawing/2010/main" xmlns="" w="9525">
                   <a:solidFill>
                     <a:srgbClr val="000000"/>
                   </a:solidFill>
@@ -1410,7 +1410,7 @@
             </a:ln>
             <a:extLst>
               <a:ext uri="{91240B29-F687-4f45-9708-019B960494DF}">
-                <a14:hiddenLine xmlns="" xmlns:a14="http://schemas.microsoft.com/office/drawing/2010/main" w="9525">
+                <a14:hiddenLine xmlns:a14="http://schemas.microsoft.com/office/drawing/2010/main" xmlns="" w="9525">
                   <a:solidFill>
                     <a:srgbClr val="000000"/>
                   </a:solidFill>
@@ -1472,7 +1472,7 @@
             </a:ln>
             <a:extLst>
               <a:ext uri="{91240B29-F687-4f45-9708-019B960494DF}">
-                <a14:hiddenLine xmlns="" xmlns:a14="http://schemas.microsoft.com/office/drawing/2010/main" w="9525">
+                <a14:hiddenLine xmlns:a14="http://schemas.microsoft.com/office/drawing/2010/main" xmlns="" w="9525">
                   <a:solidFill>
                     <a:srgbClr val="000000"/>
                   </a:solidFill>
@@ -1582,7 +1582,7 @@
             </a:ln>
             <a:extLst>
               <a:ext uri="{91240B29-F687-4f45-9708-019B960494DF}">
-                <a14:hiddenLine xmlns="" xmlns:a14="http://schemas.microsoft.com/office/drawing/2010/main" w="9525">
+                <a14:hiddenLine xmlns:a14="http://schemas.microsoft.com/office/drawing/2010/main" xmlns="" w="9525">
                   <a:solidFill>
                     <a:srgbClr val="000000"/>
                   </a:solidFill>
@@ -1644,7 +1644,7 @@
             </a:ln>
             <a:extLst>
               <a:ext uri="{91240B29-F687-4f45-9708-019B960494DF}">
-                <a14:hiddenLine xmlns="" xmlns:a14="http://schemas.microsoft.com/office/drawing/2010/main" w="9525">
+                <a14:hiddenLine xmlns:a14="http://schemas.microsoft.com/office/drawing/2010/main" xmlns="" w="9525">
                   <a:solidFill>
                     <a:srgbClr val="000000"/>
                   </a:solidFill>
@@ -1734,7 +1734,7 @@
             </a:ln>
             <a:extLst>
               <a:ext uri="{91240B29-F687-4f45-9708-019B960494DF}">
-                <a14:hiddenLine xmlns="" xmlns:a14="http://schemas.microsoft.com/office/drawing/2010/main" w="9525">
+                <a14:hiddenLine xmlns:a14="http://schemas.microsoft.com/office/drawing/2010/main" xmlns="" w="9525">
                   <a:solidFill>
                     <a:srgbClr val="000000"/>
                   </a:solidFill>
@@ -1824,7 +1824,7 @@
             </a:ln>
             <a:extLst>
               <a:ext uri="{91240B29-F687-4f45-9708-019B960494DF}">
-                <a14:hiddenLine xmlns="" xmlns:a14="http://schemas.microsoft.com/office/drawing/2010/main" w="9525">
+                <a14:hiddenLine xmlns:a14="http://schemas.microsoft.com/office/drawing/2010/main" xmlns="" w="9525">
                   <a:solidFill>
                     <a:srgbClr val="000000"/>
                   </a:solidFill>
@@ -1886,7 +1886,7 @@
             </a:ln>
             <a:extLst>
               <a:ext uri="{91240B29-F687-4f45-9708-019B960494DF}">
-                <a14:hiddenLine xmlns="" xmlns:a14="http://schemas.microsoft.com/office/drawing/2010/main" w="9525">
+                <a14:hiddenLine xmlns:a14="http://schemas.microsoft.com/office/drawing/2010/main" xmlns="" w="9525">
                   <a:solidFill>
                     <a:srgbClr val="000000"/>
                   </a:solidFill>
@@ -1976,7 +1976,7 @@
             </a:ln>
             <a:extLst>
               <a:ext uri="{91240B29-F687-4f45-9708-019B960494DF}">
-                <a14:hiddenLine xmlns="" xmlns:a14="http://schemas.microsoft.com/office/drawing/2010/main" w="9525">
+                <a14:hiddenLine xmlns:a14="http://schemas.microsoft.com/office/drawing/2010/main" xmlns="" w="9525">
                   <a:solidFill>
                     <a:srgbClr val="000000"/>
                   </a:solidFill>
@@ -2066,7 +2066,7 @@
             </a:ln>
             <a:extLst>
               <a:ext uri="{91240B29-F687-4f45-9708-019B960494DF}">
-                <a14:hiddenLine xmlns="" xmlns:a14="http://schemas.microsoft.com/office/drawing/2010/main" w="9525">
+                <a14:hiddenLine xmlns:a14="http://schemas.microsoft.com/office/drawing/2010/main" xmlns="" w="9525">
                   <a:solidFill>
                     <a:srgbClr val="000000"/>
                   </a:solidFill>
@@ -2122,7 +2122,7 @@
             </a:ln>
             <a:extLst>
               <a:ext uri="{91240B29-F687-4f45-9708-019B960494DF}">
-                <a14:hiddenLine xmlns="" xmlns:a14="http://schemas.microsoft.com/office/drawing/2010/main" w="9525">
+                <a14:hiddenLine xmlns:a14="http://schemas.microsoft.com/office/drawing/2010/main" xmlns="" w="9525">
                   <a:solidFill>
                     <a:srgbClr val="000000"/>
                   </a:solidFill>
@@ -2212,7 +2212,7 @@
             </a:ln>
             <a:extLst>
               <a:ext uri="{91240B29-F687-4f45-9708-019B960494DF}">
-                <a14:hiddenLine xmlns="" xmlns:a14="http://schemas.microsoft.com/office/drawing/2010/main" w="9525">
+                <a14:hiddenLine xmlns:a14="http://schemas.microsoft.com/office/drawing/2010/main" xmlns="" w="9525">
                   <a:solidFill>
                     <a:srgbClr val="000000"/>
                   </a:solidFill>
@@ -2268,7 +2268,7 @@
             </a:ln>
             <a:extLst>
               <a:ext uri="{91240B29-F687-4f45-9708-019B960494DF}">
-                <a14:hiddenLine xmlns="" xmlns:a14="http://schemas.microsoft.com/office/drawing/2010/main" w="9525">
+                <a14:hiddenLine xmlns:a14="http://schemas.microsoft.com/office/drawing/2010/main" xmlns="" w="9525">
                   <a:solidFill>
                     <a:srgbClr val="000000"/>
                   </a:solidFill>
@@ -2358,7 +2358,7 @@
             </a:ln>
             <a:extLst>
               <a:ext uri="{91240B29-F687-4f45-9708-019B960494DF}">
-                <a14:hiddenLine xmlns="" xmlns:a14="http://schemas.microsoft.com/office/drawing/2010/main" w="9525">
+                <a14:hiddenLine xmlns:a14="http://schemas.microsoft.com/office/drawing/2010/main" xmlns="" w="9525">
                   <a:solidFill>
                     <a:srgbClr val="000000"/>
                   </a:solidFill>
@@ -2426,7 +2426,7 @@
             </a:ln>
             <a:extLst>
               <a:ext uri="{91240B29-F687-4f45-9708-019B960494DF}">
-                <a14:hiddenLine xmlns="" xmlns:a14="http://schemas.microsoft.com/office/drawing/2010/main" w="9525">
+                <a14:hiddenLine xmlns:a14="http://schemas.microsoft.com/office/drawing/2010/main" xmlns="" w="9525">
                   <a:solidFill>
                     <a:srgbClr val="000000"/>
                   </a:solidFill>
@@ -2516,7 +2516,7 @@
             </a:ln>
             <a:extLst>
               <a:ext uri="{91240B29-F687-4f45-9708-019B960494DF}">
-                <a14:hiddenLine xmlns="" xmlns:a14="http://schemas.microsoft.com/office/drawing/2010/main" w="9525">
+                <a14:hiddenLine xmlns:a14="http://schemas.microsoft.com/office/drawing/2010/main" xmlns="" w="9525">
                   <a:solidFill>
                     <a:srgbClr val="000000"/>
                   </a:solidFill>
@@ -2584,7 +2584,7 @@
             </a:ln>
             <a:extLst>
               <a:ext uri="{91240B29-F687-4f45-9708-019B960494DF}">
-                <a14:hiddenLine xmlns="" xmlns:a14="http://schemas.microsoft.com/office/drawing/2010/main" w="9525">
+                <a14:hiddenLine xmlns:a14="http://schemas.microsoft.com/office/drawing/2010/main" xmlns="" w="9525">
                   <a:solidFill>
                     <a:srgbClr val="000000"/>
                   </a:solidFill>
@@ -2674,7 +2674,7 @@
             </a:ln>
             <a:extLst>
               <a:ext uri="{91240B29-F687-4f45-9708-019B960494DF}">
-                <a14:hiddenLine xmlns="" xmlns:a14="http://schemas.microsoft.com/office/drawing/2010/main" w="9525">
+                <a14:hiddenLine xmlns:a14="http://schemas.microsoft.com/office/drawing/2010/main" xmlns="" w="9525">
                   <a:solidFill>
                     <a:srgbClr val="000000"/>
                   </a:solidFill>
@@ -2708,7 +2708,7 @@
             </a:ln>
             <a:extLst>
               <a:ext uri="{91240B29-F687-4f45-9708-019B960494DF}">
-                <a14:hiddenLine xmlns="" xmlns:a14="http://schemas.microsoft.com/office/drawing/2010/main" w="9525">
+                <a14:hiddenLine xmlns:a14="http://schemas.microsoft.com/office/drawing/2010/main" xmlns="" w="9525">
                   <a:solidFill>
                     <a:srgbClr val="000000"/>
                   </a:solidFill>
@@ -2798,7 +2798,7 @@
             </a:ln>
             <a:extLst>
               <a:ext uri="{91240B29-F687-4f45-9708-019B960494DF}">
-                <a14:hiddenLine xmlns="" xmlns:a14="http://schemas.microsoft.com/office/drawing/2010/main" w="9525">
+                <a14:hiddenLine xmlns:a14="http://schemas.microsoft.com/office/drawing/2010/main" xmlns="" w="9525">
                   <a:solidFill>
                     <a:srgbClr val="000000"/>
                   </a:solidFill>
@@ -2860,7 +2860,7 @@
             </a:ln>
             <a:extLst>
               <a:ext uri="{91240B29-F687-4f45-9708-019B960494DF}">
-                <a14:hiddenLine xmlns="" xmlns:a14="http://schemas.microsoft.com/office/drawing/2010/main" w="9525">
+                <a14:hiddenLine xmlns:a14="http://schemas.microsoft.com/office/drawing/2010/main" xmlns="" w="9525">
                   <a:solidFill>
                     <a:srgbClr val="000000"/>
                   </a:solidFill>
@@ -2922,7 +2922,7 @@
             </a:ln>
             <a:extLst>
               <a:ext uri="{91240B29-F687-4f45-9708-019B960494DF}">
-                <a14:hiddenLine xmlns="" xmlns:a14="http://schemas.microsoft.com/office/drawing/2010/main" w="9525">
+                <a14:hiddenLine xmlns:a14="http://schemas.microsoft.com/office/drawing/2010/main" xmlns="" w="9525">
                   <a:solidFill>
                     <a:srgbClr val="000000"/>
                   </a:solidFill>
@@ -3012,7 +3012,7 @@
             </a:ln>
             <a:extLst>
               <a:ext uri="{91240B29-F687-4f45-9708-019B960494DF}">
-                <a14:hiddenLine xmlns="" xmlns:a14="http://schemas.microsoft.com/office/drawing/2010/main" w="9525">
+                <a14:hiddenLine xmlns:a14="http://schemas.microsoft.com/office/drawing/2010/main" xmlns="" w="9525">
                   <a:solidFill>
                     <a:srgbClr val="000000"/>
                   </a:solidFill>
@@ -3080,7 +3080,7 @@
             </a:ln>
             <a:extLst>
               <a:ext uri="{91240B29-F687-4f45-9708-019B960494DF}">
-                <a14:hiddenLine xmlns="" xmlns:a14="http://schemas.microsoft.com/office/drawing/2010/main" w="9525">
+                <a14:hiddenLine xmlns:a14="http://schemas.microsoft.com/office/drawing/2010/main" xmlns="" w="9525">
                   <a:solidFill>
                     <a:srgbClr val="000000"/>
                   </a:solidFill>
@@ -3142,7 +3142,7 @@
             </a:ln>
             <a:extLst>
               <a:ext uri="{91240B29-F687-4f45-9708-019B960494DF}">
-                <a14:hiddenLine xmlns="" xmlns:a14="http://schemas.microsoft.com/office/drawing/2010/main" w="9525">
+                <a14:hiddenLine xmlns:a14="http://schemas.microsoft.com/office/drawing/2010/main" xmlns="" w="9525">
                   <a:solidFill>
                     <a:srgbClr val="000000"/>
                   </a:solidFill>
@@ -3232,7 +3232,7 @@
             </a:ln>
             <a:extLst>
               <a:ext uri="{91240B29-F687-4f45-9708-019B960494DF}">
-                <a14:hiddenLine xmlns="" xmlns:a14="http://schemas.microsoft.com/office/drawing/2010/main" w="9525">
+                <a14:hiddenLine xmlns:a14="http://schemas.microsoft.com/office/drawing/2010/main" xmlns="" w="9525">
                   <a:solidFill>
                     <a:srgbClr val="000000"/>
                   </a:solidFill>
@@ -3294,7 +3294,7 @@
             </a:ln>
             <a:extLst>
               <a:ext uri="{91240B29-F687-4f45-9708-019B960494DF}">
-                <a14:hiddenLine xmlns="" xmlns:a14="http://schemas.microsoft.com/office/drawing/2010/main" w="9525">
+                <a14:hiddenLine xmlns:a14="http://schemas.microsoft.com/office/drawing/2010/main" xmlns="" w="9525">
                   <a:solidFill>
                     <a:srgbClr val="000000"/>
                   </a:solidFill>
@@ -3384,7 +3384,7 @@
             </a:ln>
             <a:extLst>
               <a:ext uri="{91240B29-F687-4f45-9708-019B960494DF}">
-                <a14:hiddenLine xmlns="" xmlns:a14="http://schemas.microsoft.com/office/drawing/2010/main" w="9525">
+                <a14:hiddenLine xmlns:a14="http://schemas.microsoft.com/office/drawing/2010/main" xmlns="" w="9525">
                   <a:solidFill>
                     <a:srgbClr val="000000"/>
                   </a:solidFill>
@@ -3446,7 +3446,7 @@
             </a:ln>
             <a:extLst>
               <a:ext uri="{91240B29-F687-4f45-9708-019B960494DF}">
-                <a14:hiddenLine xmlns="" xmlns:a14="http://schemas.microsoft.com/office/drawing/2010/main" w="9525">
+                <a14:hiddenLine xmlns:a14="http://schemas.microsoft.com/office/drawing/2010/main" xmlns="" w="9525">
                   <a:solidFill>
                     <a:srgbClr val="000000"/>
                   </a:solidFill>
@@ -3536,7 +3536,7 @@
             </a:ln>
             <a:extLst>
               <a:ext uri="{91240B29-F687-4f45-9708-019B960494DF}">
-                <a14:hiddenLine xmlns="" xmlns:a14="http://schemas.microsoft.com/office/drawing/2010/main" w="9525">
+                <a14:hiddenLine xmlns:a14="http://schemas.microsoft.com/office/drawing/2010/main" xmlns="" w="9525">
                   <a:solidFill>
                     <a:srgbClr val="000000"/>
                   </a:solidFill>
@@ -3570,7 +3570,7 @@
             </a:ln>
             <a:extLst>
               <a:ext uri="{91240B29-F687-4f45-9708-019B960494DF}">
-                <a14:hiddenLine xmlns="" xmlns:a14="http://schemas.microsoft.com/office/drawing/2010/main" w="9525">
+                <a14:hiddenLine xmlns:a14="http://schemas.microsoft.com/office/drawing/2010/main" xmlns="" w="9525">
                   <a:solidFill>
                     <a:srgbClr val="000000"/>
                   </a:solidFill>
@@ -3635,7 +3635,7 @@
             </a:ln>
             <a:extLst>
               <a:ext uri="{91240B29-F687-4f45-9708-019B960494DF}">
-                <a14:hiddenLine xmlns="" xmlns:a14="http://schemas.microsoft.com/office/drawing/2010/main" w="9525">
+                <a14:hiddenLine xmlns:a14="http://schemas.microsoft.com/office/drawing/2010/main" xmlns="" w="9525">
                   <a:solidFill>
                     <a:srgbClr val="000000"/>
                   </a:solidFill>
@@ -3725,7 +3725,7 @@
             </a:ln>
             <a:extLst>
               <a:ext uri="{91240B29-F687-4f45-9708-019B960494DF}">
-                <a14:hiddenLine xmlns="" xmlns:a14="http://schemas.microsoft.com/office/drawing/2010/main" w="9525">
+                <a14:hiddenLine xmlns:a14="http://schemas.microsoft.com/office/drawing/2010/main" xmlns="" w="9525">
                   <a:solidFill>
                     <a:srgbClr val="000000"/>
                   </a:solidFill>
@@ -3787,7 +3787,7 @@
             </a:ln>
             <a:extLst>
               <a:ext uri="{91240B29-F687-4f45-9708-019B960494DF}">
-                <a14:hiddenLine xmlns="" xmlns:a14="http://schemas.microsoft.com/office/drawing/2010/main" w="9525">
+                <a14:hiddenLine xmlns:a14="http://schemas.microsoft.com/office/drawing/2010/main" xmlns="" w="9525">
                   <a:solidFill>
                     <a:srgbClr val="000000"/>
                   </a:solidFill>
@@ -3877,7 +3877,7 @@
             </a:ln>
             <a:extLst>
               <a:ext uri="{91240B29-F687-4f45-9708-019B960494DF}">
-                <a14:hiddenLine xmlns="" xmlns:a14="http://schemas.microsoft.com/office/drawing/2010/main" w="9525">
+                <a14:hiddenLine xmlns:a14="http://schemas.microsoft.com/office/drawing/2010/main" xmlns="" w="9525">
                   <a:solidFill>
                     <a:srgbClr val="000000"/>
                   </a:solidFill>
@@ -3967,7 +3967,7 @@
             </a:ln>
             <a:extLst>
               <a:ext uri="{91240B29-F687-4f45-9708-019B960494DF}">
-                <a14:hiddenLine xmlns="" xmlns:a14="http://schemas.microsoft.com/office/drawing/2010/main" w="9525">
+                <a14:hiddenLine xmlns:a14="http://schemas.microsoft.com/office/drawing/2010/main" xmlns="" w="9525">
                   <a:solidFill>
                     <a:srgbClr val="000000"/>
                   </a:solidFill>
@@ -4032,7 +4032,7 @@
             </a:ln>
             <a:extLst>
               <a:ext uri="{91240B29-F687-4f45-9708-019B960494DF}">
-                <a14:hiddenLine xmlns="" xmlns:a14="http://schemas.microsoft.com/office/drawing/2010/main" w="9525">
+                <a14:hiddenLine xmlns:a14="http://schemas.microsoft.com/office/drawing/2010/main" xmlns="" w="9525">
                   <a:solidFill>
                     <a:srgbClr val="000000"/>
                   </a:solidFill>
@@ -4094,7 +4094,7 @@
             </a:ln>
             <a:extLst>
               <a:ext uri="{91240B29-F687-4f45-9708-019B960494DF}">
-                <a14:hiddenLine xmlns="" xmlns:a14="http://schemas.microsoft.com/office/drawing/2010/main" w="9525">
+                <a14:hiddenLine xmlns:a14="http://schemas.microsoft.com/office/drawing/2010/main" xmlns="" w="9525">
                   <a:solidFill>
                     <a:srgbClr val="000000"/>
                   </a:solidFill>
@@ -4184,7 +4184,7 @@
             </a:ln>
             <a:extLst>
               <a:ext uri="{91240B29-F687-4f45-9708-019B960494DF}">
-                <a14:hiddenLine xmlns="" xmlns:a14="http://schemas.microsoft.com/office/drawing/2010/main" w="9525">
+                <a14:hiddenLine xmlns:a14="http://schemas.microsoft.com/office/drawing/2010/main" xmlns="" w="9525">
                   <a:solidFill>
                     <a:srgbClr val="000000"/>
                   </a:solidFill>
@@ -4274,7 +4274,7 @@
             </a:ln>
             <a:extLst>
               <a:ext uri="{91240B29-F687-4f45-9708-019B960494DF}">
-                <a14:hiddenLine xmlns="" xmlns:a14="http://schemas.microsoft.com/office/drawing/2010/main" w="9525">
+                <a14:hiddenLine xmlns:a14="http://schemas.microsoft.com/office/drawing/2010/main" xmlns="" w="9525">
                   <a:solidFill>
                     <a:srgbClr val="000000"/>
                   </a:solidFill>
@@ -4336,7 +4336,7 @@
             </a:ln>
             <a:extLst>
               <a:ext uri="{91240B29-F687-4f45-9708-019B960494DF}">
-                <a14:hiddenLine xmlns="" xmlns:a14="http://schemas.microsoft.com/office/drawing/2010/main" w="9525">
+                <a14:hiddenLine xmlns:a14="http://schemas.microsoft.com/office/drawing/2010/main" xmlns="" w="9525">
                   <a:solidFill>
                     <a:srgbClr val="000000"/>
                   </a:solidFill>
@@ -4456,7 +4456,7 @@
             </a:ln>
             <a:extLst>
               <a:ext uri="{91240B29-F687-4f45-9708-019B960494DF}">
-                <a14:hiddenLine xmlns="" xmlns:a14="http://schemas.microsoft.com/office/drawing/2010/main" w="9525">
+                <a14:hiddenLine xmlns:a14="http://schemas.microsoft.com/office/drawing/2010/main" xmlns="" w="9525">
                   <a:solidFill>
                     <a:srgbClr val="000000"/>
                   </a:solidFill>
@@ -4524,7 +4524,7 @@
             </a:ln>
             <a:extLst>
               <a:ext uri="{91240B29-F687-4f45-9708-019B960494DF}">
-                <a14:hiddenLine xmlns="" xmlns:a14="http://schemas.microsoft.com/office/drawing/2010/main" w="9525">
+                <a14:hiddenLine xmlns:a14="http://schemas.microsoft.com/office/drawing/2010/main" xmlns="" w="9525">
                   <a:solidFill>
                     <a:srgbClr val="000000"/>
                   </a:solidFill>
@@ -4614,7 +4614,7 @@
             </a:ln>
             <a:extLst>
               <a:ext uri="{91240B29-F687-4f45-9708-019B960494DF}">
-                <a14:hiddenLine xmlns="" xmlns:a14="http://schemas.microsoft.com/office/drawing/2010/main" w="9525">
+                <a14:hiddenLine xmlns:a14="http://schemas.microsoft.com/office/drawing/2010/main" xmlns="" w="9525">
                   <a:solidFill>
                     <a:srgbClr val="000000"/>
                   </a:solidFill>
@@ -4754,7 +4754,7 @@
           <a:p>
             <a:fld id="{2E6956D0-FF82-46DA-9F38-706DC86F0D56}" type="datetime1">
               <a:rPr lang="en-US" smtClean="0"/>
-              <a:t>4/16/2025</a:t>
+              <a:t>4/17/2025</a:t>
             </a:fld>
             <a:endParaRPr lang="en-US" dirty="0"/>
           </a:p>
@@ -5049,7 +5049,7 @@
           <a:p>
             <a:fld id="{B29A0609-7FEE-4DC0-9780-D623E024975E}" type="datetime1">
               <a:rPr lang="en-US" smtClean="0"/>
-              <a:t>4/16/2025</a:t>
+              <a:t>4/17/2025</a:t>
             </a:fld>
             <a:endParaRPr lang="en-US" dirty="0"/>
           </a:p>
@@ -5243,7 +5243,7 @@
           <a:p>
             <a:fld id="{D8595C36-295C-44A6-AB85-859B320446F8}" type="datetime1">
               <a:rPr lang="en-US" smtClean="0"/>
-              <a:t>4/16/2025</a:t>
+              <a:t>4/17/2025</a:t>
             </a:fld>
             <a:endParaRPr lang="en-US" dirty="0"/>
           </a:p>
@@ -5504,7 +5504,7 @@
           <a:p>
             <a:fld id="{99F217E4-37B9-4791-A38E-D8BC4AED1ACB}" type="datetime1">
               <a:rPr lang="en-US" smtClean="0"/>
-              <a:t>4/16/2025</a:t>
+              <a:t>4/17/2025</a:t>
             </a:fld>
             <a:endParaRPr lang="en-US" dirty="0"/>
           </a:p>
@@ -5937,7 +5937,7 @@
           <a:p>
             <a:fld id="{7326BBBD-F342-45E3-84E1-84BE66868B86}" type="datetime1">
               <a:rPr lang="en-US" smtClean="0"/>
-              <a:t>4/16/2025</a:t>
+              <a:t>4/17/2025</a:t>
             </a:fld>
             <a:endParaRPr lang="en-US" dirty="0"/>
           </a:p>
@@ -6482,7 +6482,7 @@
           <a:p>
             <a:fld id="{BF8B92E3-5D56-4D9D-A69E-DE111053FD9E}" type="datetime1">
               <a:rPr lang="en-US" smtClean="0"/>
-              <a:t>4/16/2025</a:t>
+              <a:t>4/17/2025</a:t>
             </a:fld>
             <a:endParaRPr lang="en-US" dirty="0"/>
           </a:p>
@@ -7200,7 +7200,7 @@
           <a:p>
             <a:fld id="{5530DBAB-C152-4B13-894C-B845E59C3017}" type="datetime1">
               <a:rPr lang="en-US" smtClean="0"/>
-              <a:t>4/16/2025</a:t>
+              <a:t>4/17/2025</a:t>
             </a:fld>
             <a:endParaRPr lang="en-US" dirty="0"/>
           </a:p>
@@ -7368,7 +7368,7 @@
           <a:p>
             <a:fld id="{5A1A901B-AC15-4CE2-B187-E1906D80C40A}" type="datetime1">
               <a:rPr lang="en-US" smtClean="0"/>
-              <a:t>4/16/2025</a:t>
+              <a:t>4/17/2025</a:t>
             </a:fld>
             <a:endParaRPr lang="en-US" dirty="0"/>
           </a:p>
@@ -7546,7 +7546,7 @@
           <a:p>
             <a:fld id="{173BF05D-F707-4D33-BC3D-A422F7F8BD2C}" type="datetime1">
               <a:rPr lang="en-US" smtClean="0"/>
-              <a:t>4/16/2025</a:t>
+              <a:t>4/17/2025</a:t>
             </a:fld>
             <a:endParaRPr lang="en-US" dirty="0"/>
           </a:p>
@@ -7714,7 +7714,7 @@
           <a:p>
             <a:fld id="{8EE2707C-063E-46D3-BE25-A9A8D80E43A6}" type="datetime1">
               <a:rPr lang="en-US" smtClean="0"/>
-              <a:t>4/16/2025</a:t>
+              <a:t>4/17/2025</a:t>
             </a:fld>
             <a:endParaRPr lang="en-US" dirty="0"/>
           </a:p>
@@ -7967,7 +7967,7 @@
           <a:p>
             <a:fld id="{DE2BBCB1-03A1-4E25-BBBE-484FF07E9034}" type="datetime1">
               <a:rPr lang="en-US" smtClean="0"/>
-              <a:t>4/16/2025</a:t>
+              <a:t>4/17/2025</a:t>
             </a:fld>
             <a:endParaRPr lang="en-US" dirty="0"/>
           </a:p>
@@ -8197,7 +8197,7 @@
           <a:p>
             <a:fld id="{32AE1E5B-2754-4F28-8433-77BB8DA5C10A}" type="datetime1">
               <a:rPr lang="en-US" smtClean="0"/>
-              <a:t>4/16/2025</a:t>
+              <a:t>4/17/2025</a:t>
             </a:fld>
             <a:endParaRPr lang="en-US" dirty="0"/>
           </a:p>
@@ -8576,7 +8576,7 @@
           <a:p>
             <a:fld id="{A949E13A-A720-4FA7-B4C3-D48667EC44AE}" type="datetime1">
               <a:rPr lang="en-US" smtClean="0"/>
-              <a:t>4/16/2025</a:t>
+              <a:t>4/17/2025</a:t>
             </a:fld>
             <a:endParaRPr lang="en-US" dirty="0"/>
           </a:p>
@@ -8692,7 +8692,7 @@
           <a:p>
             <a:fld id="{8907D086-5A12-4193-995F-F84EC02B1AD8}" type="datetime1">
               <a:rPr lang="en-US" smtClean="0"/>
-              <a:t>4/16/2025</a:t>
+              <a:t>4/17/2025</a:t>
             </a:fld>
             <a:endParaRPr lang="en-US" dirty="0"/>
           </a:p>
@@ -8785,7 +8785,7 @@
           <a:p>
             <a:fld id="{AE68C3A2-0540-4972-9AF7-3C65A04AEEB6}" type="datetime1">
               <a:rPr lang="en-US" smtClean="0"/>
-              <a:t>4/16/2025</a:t>
+              <a:t>4/17/2025</a:t>
             </a:fld>
             <a:endParaRPr lang="en-US" dirty="0"/>
           </a:p>
@@ -9032,7 +9032,7 @@
           <a:p>
             <a:fld id="{E1972B15-44AC-4DC1-B1E2-4E855788D9BC}" type="datetime1">
               <a:rPr lang="en-US" smtClean="0"/>
-              <a:t>4/16/2025</a:t>
+              <a:t>4/17/2025</a:t>
             </a:fld>
             <a:endParaRPr lang="en-US" dirty="0"/>
           </a:p>
@@ -9310,7 +9310,7 @@
           <a:p>
             <a:fld id="{35586A4F-619C-4F02-A396-839181AC6BB4}" type="datetime1">
               <a:rPr lang="en-US" smtClean="0"/>
-              <a:t>4/16/2025</a:t>
+              <a:t>4/17/2025</a:t>
             </a:fld>
             <a:endParaRPr lang="en-US" dirty="0"/>
           </a:p>
@@ -9424,7 +9424,7 @@
           <a:noFill/>
           <a:extLst>
             <a:ext uri="{909E8E84-426E-40dd-AFC4-6F175D3DCCD1}">
-              <a14:hiddenFill xmlns="" xmlns:a14="http://schemas.microsoft.com/office/drawing/2010/main">
+              <a14:hiddenFill xmlns:a14="http://schemas.microsoft.com/office/drawing/2010/main" xmlns="">
                 <a:solidFill>
                   <a:srgbClr val="FFFFFF"/>
                 </a:solidFill>
@@ -9498,7 +9498,7 @@
               </a:ln>
               <a:extLst>
                 <a:ext uri="{91240B29-F687-4f45-9708-019B960494DF}">
-                  <a14:hiddenLine xmlns="" xmlns:a14="http://schemas.microsoft.com/office/drawing/2010/main" w="9525">
+                  <a14:hiddenLine xmlns:a14="http://schemas.microsoft.com/office/drawing/2010/main" xmlns="" w="9525">
                     <a:solidFill>
                       <a:srgbClr val="000000"/>
                     </a:solidFill>
@@ -9588,7 +9588,7 @@
               </a:ln>
               <a:extLst>
                 <a:ext uri="{91240B29-F687-4f45-9708-019B960494DF}">
-                  <a14:hiddenLine xmlns="" xmlns:a14="http://schemas.microsoft.com/office/drawing/2010/main" w="9525">
+                  <a14:hiddenLine xmlns:a14="http://schemas.microsoft.com/office/drawing/2010/main" xmlns="" w="9525">
                     <a:solidFill>
                       <a:srgbClr val="000000"/>
                     </a:solidFill>
@@ -9678,7 +9678,7 @@
               </a:ln>
               <a:extLst>
                 <a:ext uri="{91240B29-F687-4f45-9708-019B960494DF}">
-                  <a14:hiddenLine xmlns="" xmlns:a14="http://schemas.microsoft.com/office/drawing/2010/main" w="9525">
+                  <a14:hiddenLine xmlns:a14="http://schemas.microsoft.com/office/drawing/2010/main" xmlns="" w="9525">
                     <a:solidFill>
                       <a:srgbClr val="000000"/>
                     </a:solidFill>
@@ -9740,7 +9740,7 @@
               </a:ln>
               <a:extLst>
                 <a:ext uri="{91240B29-F687-4f45-9708-019B960494DF}">
-                  <a14:hiddenLine xmlns="" xmlns:a14="http://schemas.microsoft.com/office/drawing/2010/main" w="9525">
+                  <a14:hiddenLine xmlns:a14="http://schemas.microsoft.com/office/drawing/2010/main" xmlns="" w="9525">
                     <a:solidFill>
                       <a:srgbClr val="000000"/>
                     </a:solidFill>
@@ -9830,7 +9830,7 @@
               </a:ln>
               <a:extLst>
                 <a:ext uri="{91240B29-F687-4f45-9708-019B960494DF}">
-                  <a14:hiddenLine xmlns="" xmlns:a14="http://schemas.microsoft.com/office/drawing/2010/main" w="9525">
+                  <a14:hiddenLine xmlns:a14="http://schemas.microsoft.com/office/drawing/2010/main" xmlns="" w="9525">
                     <a:solidFill>
                       <a:srgbClr val="000000"/>
                     </a:solidFill>
@@ -9892,7 +9892,7 @@
               </a:ln>
               <a:extLst>
                 <a:ext uri="{91240B29-F687-4f45-9708-019B960494DF}">
-                  <a14:hiddenLine xmlns="" xmlns:a14="http://schemas.microsoft.com/office/drawing/2010/main" w="9525">
+                  <a14:hiddenLine xmlns:a14="http://schemas.microsoft.com/office/drawing/2010/main" xmlns="" w="9525">
                     <a:solidFill>
                       <a:srgbClr val="000000"/>
                     </a:solidFill>
@@ -9954,7 +9954,7 @@
               </a:ln>
               <a:extLst>
                 <a:ext uri="{91240B29-F687-4f45-9708-019B960494DF}">
-                  <a14:hiddenLine xmlns="" xmlns:a14="http://schemas.microsoft.com/office/drawing/2010/main" w="9525">
+                  <a14:hiddenLine xmlns:a14="http://schemas.microsoft.com/office/drawing/2010/main" xmlns="" w="9525">
                     <a:solidFill>
                       <a:srgbClr val="000000"/>
                     </a:solidFill>
@@ -10044,7 +10044,7 @@
               </a:ln>
               <a:extLst>
                 <a:ext uri="{91240B29-F687-4f45-9708-019B960494DF}">
-                  <a14:hiddenLine xmlns="" xmlns:a14="http://schemas.microsoft.com/office/drawing/2010/main" w="9525">
+                  <a14:hiddenLine xmlns:a14="http://schemas.microsoft.com/office/drawing/2010/main" xmlns="" w="9525">
                     <a:solidFill>
                       <a:srgbClr val="000000"/>
                     </a:solidFill>
@@ -10134,7 +10134,7 @@
               </a:ln>
               <a:extLst>
                 <a:ext uri="{91240B29-F687-4f45-9708-019B960494DF}">
-                  <a14:hiddenLine xmlns="" xmlns:a14="http://schemas.microsoft.com/office/drawing/2010/main" w="9525">
+                  <a14:hiddenLine xmlns:a14="http://schemas.microsoft.com/office/drawing/2010/main" xmlns="" w="9525">
                     <a:solidFill>
                       <a:srgbClr val="000000"/>
                     </a:solidFill>
@@ -10196,7 +10196,7 @@
               </a:ln>
               <a:extLst>
                 <a:ext uri="{91240B29-F687-4f45-9708-019B960494DF}">
-                  <a14:hiddenLine xmlns="" xmlns:a14="http://schemas.microsoft.com/office/drawing/2010/main" w="9525">
+                  <a14:hiddenLine xmlns:a14="http://schemas.microsoft.com/office/drawing/2010/main" xmlns="" w="9525">
                     <a:solidFill>
                       <a:srgbClr val="000000"/>
                     </a:solidFill>
@@ -10306,7 +10306,7 @@
               </a:ln>
               <a:extLst>
                 <a:ext uri="{91240B29-F687-4f45-9708-019B960494DF}">
-                  <a14:hiddenLine xmlns="" xmlns:a14="http://schemas.microsoft.com/office/drawing/2010/main" w="9525">
+                  <a14:hiddenLine xmlns:a14="http://schemas.microsoft.com/office/drawing/2010/main" xmlns="" w="9525">
                     <a:solidFill>
                       <a:srgbClr val="000000"/>
                     </a:solidFill>
@@ -10390,7 +10390,7 @@
               </a:ln>
               <a:extLst>
                 <a:ext uri="{91240B29-F687-4f45-9708-019B960494DF}">
-                  <a14:hiddenLine xmlns="" xmlns:a14="http://schemas.microsoft.com/office/drawing/2010/main" w="9525">
+                  <a14:hiddenLine xmlns:a14="http://schemas.microsoft.com/office/drawing/2010/main" xmlns="" w="9525">
                     <a:solidFill>
                       <a:srgbClr val="000000"/>
                     </a:solidFill>
@@ -10452,7 +10452,7 @@
               </a:ln>
               <a:extLst>
                 <a:ext uri="{91240B29-F687-4f45-9708-019B960494DF}">
-                  <a14:hiddenLine xmlns="" xmlns:a14="http://schemas.microsoft.com/office/drawing/2010/main" w="9525">
+                  <a14:hiddenLine xmlns:a14="http://schemas.microsoft.com/office/drawing/2010/main" xmlns="" w="9525">
                     <a:solidFill>
                       <a:srgbClr val="000000"/>
                     </a:solidFill>
@@ -10514,7 +10514,7 @@
               </a:ln>
               <a:extLst>
                 <a:ext uri="{91240B29-F687-4f45-9708-019B960494DF}">
-                  <a14:hiddenLine xmlns="" xmlns:a14="http://schemas.microsoft.com/office/drawing/2010/main" w="9525">
+                  <a14:hiddenLine xmlns:a14="http://schemas.microsoft.com/office/drawing/2010/main" xmlns="" w="9525">
                     <a:solidFill>
                       <a:srgbClr val="000000"/>
                     </a:solidFill>
@@ -10604,7 +10604,7 @@
               </a:ln>
               <a:extLst>
                 <a:ext uri="{91240B29-F687-4f45-9708-019B960494DF}">
-                  <a14:hiddenLine xmlns="" xmlns:a14="http://schemas.microsoft.com/office/drawing/2010/main" w="9525">
+                  <a14:hiddenLine xmlns:a14="http://schemas.microsoft.com/office/drawing/2010/main" xmlns="" w="9525">
                     <a:solidFill>
                       <a:srgbClr val="000000"/>
                     </a:solidFill>
@@ -10638,7 +10638,7 @@
               </a:ln>
               <a:extLst>
                 <a:ext uri="{91240B29-F687-4f45-9708-019B960494DF}">
-                  <a14:hiddenLine xmlns="" xmlns:a14="http://schemas.microsoft.com/office/drawing/2010/main" w="9525">
+                  <a14:hiddenLine xmlns:a14="http://schemas.microsoft.com/office/drawing/2010/main" xmlns="" w="9525">
                     <a:solidFill>
                       <a:srgbClr val="000000"/>
                     </a:solidFill>
@@ -10703,7 +10703,7 @@
               </a:ln>
               <a:extLst>
                 <a:ext uri="{91240B29-F687-4f45-9708-019B960494DF}">
-                  <a14:hiddenLine xmlns="" xmlns:a14="http://schemas.microsoft.com/office/drawing/2010/main" w="9525">
+                  <a14:hiddenLine xmlns:a14="http://schemas.microsoft.com/office/drawing/2010/main" xmlns="" w="9525">
                     <a:solidFill>
                       <a:srgbClr val="000000"/>
                     </a:solidFill>
@@ -10793,7 +10793,7 @@
               </a:ln>
               <a:extLst>
                 <a:ext uri="{91240B29-F687-4f45-9708-019B960494DF}">
-                  <a14:hiddenLine xmlns="" xmlns:a14="http://schemas.microsoft.com/office/drawing/2010/main" w="9525">
+                  <a14:hiddenLine xmlns:a14="http://schemas.microsoft.com/office/drawing/2010/main" xmlns="" w="9525">
                     <a:solidFill>
                       <a:srgbClr val="000000"/>
                     </a:solidFill>
@@ -10855,7 +10855,7 @@
               </a:ln>
               <a:extLst>
                 <a:ext uri="{91240B29-F687-4f45-9708-019B960494DF}">
-                  <a14:hiddenLine xmlns="" xmlns:a14="http://schemas.microsoft.com/office/drawing/2010/main" w="9525">
+                  <a14:hiddenLine xmlns:a14="http://schemas.microsoft.com/office/drawing/2010/main" xmlns="" w="9525">
                     <a:solidFill>
                       <a:srgbClr val="000000"/>
                     </a:solidFill>
@@ -10945,7 +10945,7 @@
               </a:ln>
               <a:extLst>
                 <a:ext uri="{91240B29-F687-4f45-9708-019B960494DF}">
-                  <a14:hiddenLine xmlns="" xmlns:a14="http://schemas.microsoft.com/office/drawing/2010/main" w="9525">
+                  <a14:hiddenLine xmlns:a14="http://schemas.microsoft.com/office/drawing/2010/main" xmlns="" w="9525">
                     <a:solidFill>
                       <a:srgbClr val="000000"/>
                     </a:solidFill>
@@ -11010,7 +11010,7 @@
               </a:ln>
               <a:extLst>
                 <a:ext uri="{91240B29-F687-4f45-9708-019B960494DF}">
-                  <a14:hiddenLine xmlns="" xmlns:a14="http://schemas.microsoft.com/office/drawing/2010/main" w="9525">
+                  <a14:hiddenLine xmlns:a14="http://schemas.microsoft.com/office/drawing/2010/main" xmlns="" w="9525">
                     <a:solidFill>
                       <a:srgbClr val="000000"/>
                     </a:solidFill>
@@ -11072,7 +11072,7 @@
               </a:ln>
               <a:extLst>
                 <a:ext uri="{91240B29-F687-4f45-9708-019B960494DF}">
-                  <a14:hiddenLine xmlns="" xmlns:a14="http://schemas.microsoft.com/office/drawing/2010/main" w="9525">
+                  <a14:hiddenLine xmlns:a14="http://schemas.microsoft.com/office/drawing/2010/main" xmlns="" w="9525">
                     <a:solidFill>
                       <a:srgbClr val="000000"/>
                     </a:solidFill>
@@ -11162,7 +11162,7 @@
               </a:ln>
               <a:extLst>
                 <a:ext uri="{91240B29-F687-4f45-9708-019B960494DF}">
-                  <a14:hiddenLine xmlns="" xmlns:a14="http://schemas.microsoft.com/office/drawing/2010/main" w="9525">
+                  <a14:hiddenLine xmlns:a14="http://schemas.microsoft.com/office/drawing/2010/main" xmlns="" w="9525">
                     <a:solidFill>
                       <a:srgbClr val="000000"/>
                     </a:solidFill>
@@ -11252,7 +11252,7 @@
               </a:ln>
               <a:extLst>
                 <a:ext uri="{91240B29-F687-4f45-9708-019B960494DF}">
-                  <a14:hiddenLine xmlns="" xmlns:a14="http://schemas.microsoft.com/office/drawing/2010/main" w="9525">
+                  <a14:hiddenLine xmlns:a14="http://schemas.microsoft.com/office/drawing/2010/main" xmlns="" w="9525">
                     <a:solidFill>
                       <a:srgbClr val="000000"/>
                     </a:solidFill>
@@ -11317,7 +11317,7 @@
               </a:ln>
               <a:extLst>
                 <a:ext uri="{91240B29-F687-4f45-9708-019B960494DF}">
-                  <a14:hiddenLine xmlns="" xmlns:a14="http://schemas.microsoft.com/office/drawing/2010/main" w="9525">
+                  <a14:hiddenLine xmlns:a14="http://schemas.microsoft.com/office/drawing/2010/main" xmlns="" w="9525">
                     <a:solidFill>
                       <a:srgbClr val="000000"/>
                     </a:solidFill>
@@ -11437,7 +11437,7 @@
               </a:ln>
               <a:extLst>
                 <a:ext uri="{91240B29-F687-4f45-9708-019B960494DF}">
-                  <a14:hiddenLine xmlns="" xmlns:a14="http://schemas.microsoft.com/office/drawing/2010/main" w="9525">
+                  <a14:hiddenLine xmlns:a14="http://schemas.microsoft.com/office/drawing/2010/main" xmlns="" w="9525">
                     <a:solidFill>
                       <a:srgbClr val="000000"/>
                     </a:solidFill>
@@ -11535,7 +11535,7 @@
               </a:ln>
               <a:extLst>
                 <a:ext uri="{91240B29-F687-4f45-9708-019B960494DF}">
-                  <a14:hiddenLine xmlns="" xmlns:a14="http://schemas.microsoft.com/office/drawing/2010/main" w="9525">
+                  <a14:hiddenLine xmlns:a14="http://schemas.microsoft.com/office/drawing/2010/main" xmlns="" w="9525">
                     <a:solidFill>
                       <a:srgbClr val="000000"/>
                     </a:solidFill>
@@ -11650,7 +11650,7 @@
               </a:ln>
               <a:extLst>
                 <a:ext uri="{91240B29-F687-4f45-9708-019B960494DF}">
-                  <a14:hiddenLine xmlns="" xmlns:a14="http://schemas.microsoft.com/office/drawing/2010/main" w="9525">
+                  <a14:hiddenLine xmlns:a14="http://schemas.microsoft.com/office/drawing/2010/main" xmlns="" w="9525">
                     <a:solidFill>
                       <a:srgbClr val="000000"/>
                     </a:solidFill>
@@ -11740,7 +11740,7 @@
               </a:ln>
               <a:extLst>
                 <a:ext uri="{91240B29-F687-4f45-9708-019B960494DF}">
-                  <a14:hiddenLine xmlns="" xmlns:a14="http://schemas.microsoft.com/office/drawing/2010/main" w="9525">
+                  <a14:hiddenLine xmlns:a14="http://schemas.microsoft.com/office/drawing/2010/main" xmlns="" w="9525">
                     <a:solidFill>
                       <a:srgbClr val="000000"/>
                     </a:solidFill>
@@ -11805,7 +11805,7 @@
               </a:ln>
               <a:extLst>
                 <a:ext uri="{91240B29-F687-4f45-9708-019B960494DF}">
-                  <a14:hiddenLine xmlns="" xmlns:a14="http://schemas.microsoft.com/office/drawing/2010/main" w="9525">
+                  <a14:hiddenLine xmlns:a14="http://schemas.microsoft.com/office/drawing/2010/main" xmlns="" w="9525">
                     <a:solidFill>
                       <a:srgbClr val="000000"/>
                     </a:solidFill>
@@ -11895,7 +11895,7 @@
               </a:ln>
               <a:extLst>
                 <a:ext uri="{91240B29-F687-4f45-9708-019B960494DF}">
-                  <a14:hiddenLine xmlns="" xmlns:a14="http://schemas.microsoft.com/office/drawing/2010/main" w="9525">
+                  <a14:hiddenLine xmlns:a14="http://schemas.microsoft.com/office/drawing/2010/main" xmlns="" w="9525">
                     <a:solidFill>
                       <a:srgbClr val="000000"/>
                     </a:solidFill>
@@ -11963,7 +11963,7 @@
               </a:ln>
               <a:extLst>
                 <a:ext uri="{91240B29-F687-4f45-9708-019B960494DF}">
-                  <a14:hiddenLine xmlns="" xmlns:a14="http://schemas.microsoft.com/office/drawing/2010/main" w="9525">
+                  <a14:hiddenLine xmlns:a14="http://schemas.microsoft.com/office/drawing/2010/main" xmlns="" w="9525">
                     <a:solidFill>
                       <a:srgbClr val="000000"/>
                     </a:solidFill>
@@ -12053,7 +12053,7 @@
               </a:ln>
               <a:extLst>
                 <a:ext uri="{91240B29-F687-4f45-9708-019B960494DF}">
-                  <a14:hiddenLine xmlns="" xmlns:a14="http://schemas.microsoft.com/office/drawing/2010/main" w="9525">
+                  <a14:hiddenLine xmlns:a14="http://schemas.microsoft.com/office/drawing/2010/main" xmlns="" w="9525">
                     <a:solidFill>
                       <a:srgbClr val="000000"/>
                     </a:solidFill>
@@ -12121,7 +12121,7 @@
               </a:ln>
               <a:extLst>
                 <a:ext uri="{91240B29-F687-4f45-9708-019B960494DF}">
-                  <a14:hiddenLine xmlns="" xmlns:a14="http://schemas.microsoft.com/office/drawing/2010/main" w="9525">
+                  <a14:hiddenLine xmlns:a14="http://schemas.microsoft.com/office/drawing/2010/main" xmlns="" w="9525">
                     <a:solidFill>
                       <a:srgbClr val="000000"/>
                     </a:solidFill>
@@ -12211,7 +12211,7 @@
               </a:ln>
               <a:extLst>
                 <a:ext uri="{91240B29-F687-4f45-9708-019B960494DF}">
-                  <a14:hiddenLine xmlns="" xmlns:a14="http://schemas.microsoft.com/office/drawing/2010/main" w="9525">
+                  <a14:hiddenLine xmlns:a14="http://schemas.microsoft.com/office/drawing/2010/main" xmlns="" w="9525">
                     <a:solidFill>
                       <a:srgbClr val="000000"/>
                     </a:solidFill>
@@ -12245,7 +12245,7 @@
               </a:ln>
               <a:extLst>
                 <a:ext uri="{91240B29-F687-4f45-9708-019B960494DF}">
-                  <a14:hiddenLine xmlns="" xmlns:a14="http://schemas.microsoft.com/office/drawing/2010/main" w="9525">
+                  <a14:hiddenLine xmlns:a14="http://schemas.microsoft.com/office/drawing/2010/main" xmlns="" w="9525">
                     <a:solidFill>
                       <a:srgbClr val="000000"/>
                     </a:solidFill>
@@ -12385,7 +12385,7 @@
           <a:p>
             <a:fld id="{9C2E08F3-6ADB-4031-89E6-89707F5CDBB1}" type="datetime1">
               <a:rPr lang="en-US" smtClean="0"/>
-              <a:t>4/16/2025</a:t>
+              <a:t>4/17/2025</a:t>
             </a:fld>
             <a:endParaRPr lang="en-US" dirty="0"/>
           </a:p>
@@ -12916,7 +12916,7 @@
           <a:p>
             <a:fld id="{DEAE2368-4D5B-4100-AD00-D730DAA20AC8}" type="datetime1">
               <a:rPr lang="en-US" smtClean="0"/>
-              <a:t>4/16/2025</a:t>
+              <a:t>4/17/2025</a:t>
             </a:fld>
             <a:endParaRPr lang="en-US" dirty="0"/>
           </a:p>
@@ -13134,7 +13134,7 @@
                   <a:schemeClr val="bg1"/>
                 </a:solidFill>
               </a:rPr>
-              <a:t>4/16/2025</a:t>
+              <a:t>4/17/2025</a:t>
             </a:fld>
             <a:endParaRPr lang="en-US" dirty="0">
               <a:solidFill>
@@ -13290,6 +13290,12 @@
             <a:endParaRPr lang="en-US" dirty="0"/>
           </a:p>
           <a:p>
+            <a:r>
+              <a:rPr lang="en-US" dirty="0">
+                <a:hlinkClick r:id="rId5"/>
+              </a:rPr>
+              <a:t>EU CRA Experts Group </a:t>
+            </a:r>
             <a:endParaRPr lang="en-US" dirty="0"/>
           </a:p>
         </p:txBody>
@@ -13317,7 +13323,7 @@
           <a:p>
             <a:fld id="{8EE2707C-063E-46D3-BE25-A9A8D80E43A6}" type="datetime1">
               <a:rPr lang="en-US" smtClean="0"/>
-              <a:t>4/16/2025</a:t>
+              <a:t>4/17/2025</a:t>
             </a:fld>
             <a:endParaRPr lang="en-US" dirty="0"/>
           </a:p>
@@ -13405,7 +13411,7 @@
           <a:p>
             <a:fld id="{8EE2707C-063E-46D3-BE25-A9A8D80E43A6}" type="datetime1">
               <a:rPr lang="en-US" smtClean="0"/>
-              <a:t>4/16/2025</a:t>
+              <a:t>4/17/2025</a:t>
             </a:fld>
             <a:endParaRPr lang="en-US" dirty="0"/>
           </a:p>

</xml_diff>

<commit_message>
Added more links referred to in the presentation
https://www.youtube.com/watch?v=IGnE7I7dyDY
</commit_message>
<xml_diff>
--- a/2025-0417-OWASP-AMHERST-EUCRA-OVERVIEW.pptx
+++ b/2025-0417-OWASP-AMHERST-EUCRA-OVERVIEW.pptx
@@ -211,7 +211,7 @@
           <a:p>
             <a:fld id="{332E4851-9EEE-4C44-B0F3-632DB06B8768}" type="datetimeFigureOut">
               <a:rPr lang="en-US" smtClean="0"/>
-              <a:t>4/17/2025</a:t>
+              <a:t>4/18/2025</a:t>
             </a:fld>
             <a:endParaRPr lang="en-US"/>
           </a:p>
@@ -528,7 +528,7 @@
           <a:noFill/>
           <a:extLst>
             <a:ext uri="{909E8E84-426E-40dd-AFC4-6F175D3DCCD1}">
-              <a14:hiddenFill xmlns:a14="http://schemas.microsoft.com/office/drawing/2010/main" xmlns="">
+              <a14:hiddenFill xmlns="" xmlns:a14="http://schemas.microsoft.com/office/drawing/2010/main">
                 <a:solidFill>
                   <a:srgbClr val="FFFFFF"/>
                 </a:solidFill>
@@ -588,7 +588,7 @@
             </a:ln>
             <a:extLst>
               <a:ext uri="{91240B29-F687-4f45-9708-019B960494DF}">
-                <a14:hiddenLine xmlns:a14="http://schemas.microsoft.com/office/drawing/2010/main" xmlns="" w="9525">
+                <a14:hiddenLine xmlns="" xmlns:a14="http://schemas.microsoft.com/office/drawing/2010/main" w="9525">
                   <a:solidFill>
                     <a:srgbClr val="000000"/>
                   </a:solidFill>
@@ -678,7 +678,7 @@
             </a:ln>
             <a:extLst>
               <a:ext uri="{91240B29-F687-4f45-9708-019B960494DF}">
-                <a14:hiddenLine xmlns:a14="http://schemas.microsoft.com/office/drawing/2010/main" xmlns="" w="9525">
+                <a14:hiddenLine xmlns="" xmlns:a14="http://schemas.microsoft.com/office/drawing/2010/main" w="9525">
                   <a:solidFill>
                     <a:srgbClr val="000000"/>
                   </a:solidFill>
@@ -768,7 +768,7 @@
             </a:ln>
             <a:extLst>
               <a:ext uri="{91240B29-F687-4f45-9708-019B960494DF}">
-                <a14:hiddenLine xmlns:a14="http://schemas.microsoft.com/office/drawing/2010/main" xmlns="" w="9525">
+                <a14:hiddenLine xmlns="" xmlns:a14="http://schemas.microsoft.com/office/drawing/2010/main" w="9525">
                   <a:solidFill>
                     <a:srgbClr val="000000"/>
                   </a:solidFill>
@@ -802,7 +802,7 @@
             </a:ln>
             <a:extLst>
               <a:ext uri="{91240B29-F687-4f45-9708-019B960494DF}">
-                <a14:hiddenLine xmlns:a14="http://schemas.microsoft.com/office/drawing/2010/main" xmlns="" w="9525">
+                <a14:hiddenLine xmlns="" xmlns:a14="http://schemas.microsoft.com/office/drawing/2010/main" w="9525">
                   <a:solidFill>
                     <a:srgbClr val="000000"/>
                   </a:solidFill>
@@ -892,7 +892,7 @@
             </a:ln>
             <a:extLst>
               <a:ext uri="{91240B29-F687-4f45-9708-019B960494DF}">
-                <a14:hiddenLine xmlns:a14="http://schemas.microsoft.com/office/drawing/2010/main" xmlns="" w="9525">
+                <a14:hiddenLine xmlns="" xmlns:a14="http://schemas.microsoft.com/office/drawing/2010/main" w="9525">
                   <a:solidFill>
                     <a:srgbClr val="000000"/>
                   </a:solidFill>
@@ -954,7 +954,7 @@
             </a:ln>
             <a:extLst>
               <a:ext uri="{91240B29-F687-4f45-9708-019B960494DF}">
-                <a14:hiddenLine xmlns:a14="http://schemas.microsoft.com/office/drawing/2010/main" xmlns="" w="9525">
+                <a14:hiddenLine xmlns="" xmlns:a14="http://schemas.microsoft.com/office/drawing/2010/main" w="9525">
                   <a:solidFill>
                     <a:srgbClr val="000000"/>
                   </a:solidFill>
@@ -1016,7 +1016,7 @@
             </a:ln>
             <a:extLst>
               <a:ext uri="{91240B29-F687-4f45-9708-019B960494DF}">
-                <a14:hiddenLine xmlns:a14="http://schemas.microsoft.com/office/drawing/2010/main" xmlns="" w="9525">
+                <a14:hiddenLine xmlns="" xmlns:a14="http://schemas.microsoft.com/office/drawing/2010/main" w="9525">
                   <a:solidFill>
                     <a:srgbClr val="000000"/>
                   </a:solidFill>
@@ -1106,7 +1106,7 @@
             </a:ln>
             <a:extLst>
               <a:ext uri="{91240B29-F687-4f45-9708-019B960494DF}">
-                <a14:hiddenLine xmlns:a14="http://schemas.microsoft.com/office/drawing/2010/main" xmlns="" w="9525">
+                <a14:hiddenLine xmlns="" xmlns:a14="http://schemas.microsoft.com/office/drawing/2010/main" w="9525">
                   <a:solidFill>
                     <a:srgbClr val="000000"/>
                   </a:solidFill>
@@ -1168,7 +1168,7 @@
             </a:ln>
             <a:extLst>
               <a:ext uri="{91240B29-F687-4f45-9708-019B960494DF}">
-                <a14:hiddenLine xmlns:a14="http://schemas.microsoft.com/office/drawing/2010/main" xmlns="" w="9525">
+                <a14:hiddenLine xmlns="" xmlns:a14="http://schemas.microsoft.com/office/drawing/2010/main" w="9525">
                   <a:solidFill>
                     <a:srgbClr val="000000"/>
                   </a:solidFill>
@@ -1230,7 +1230,7 @@
             </a:ln>
             <a:extLst>
               <a:ext uri="{91240B29-F687-4f45-9708-019B960494DF}">
-                <a14:hiddenLine xmlns:a14="http://schemas.microsoft.com/office/drawing/2010/main" xmlns="" w="9525">
+                <a14:hiddenLine xmlns="" xmlns:a14="http://schemas.microsoft.com/office/drawing/2010/main" w="9525">
                   <a:solidFill>
                     <a:srgbClr val="000000"/>
                   </a:solidFill>
@@ -1320,7 +1320,7 @@
             </a:ln>
             <a:extLst>
               <a:ext uri="{91240B29-F687-4f45-9708-019B960494DF}">
-                <a14:hiddenLine xmlns:a14="http://schemas.microsoft.com/office/drawing/2010/main" xmlns="" w="9525">
+                <a14:hiddenLine xmlns="" xmlns:a14="http://schemas.microsoft.com/office/drawing/2010/main" w="9525">
                   <a:solidFill>
                     <a:srgbClr val="000000"/>
                   </a:solidFill>
@@ -1410,7 +1410,7 @@
             </a:ln>
             <a:extLst>
               <a:ext uri="{91240B29-F687-4f45-9708-019B960494DF}">
-                <a14:hiddenLine xmlns:a14="http://schemas.microsoft.com/office/drawing/2010/main" xmlns="" w="9525">
+                <a14:hiddenLine xmlns="" xmlns:a14="http://schemas.microsoft.com/office/drawing/2010/main" w="9525">
                   <a:solidFill>
                     <a:srgbClr val="000000"/>
                   </a:solidFill>
@@ -1472,7 +1472,7 @@
             </a:ln>
             <a:extLst>
               <a:ext uri="{91240B29-F687-4f45-9708-019B960494DF}">
-                <a14:hiddenLine xmlns:a14="http://schemas.microsoft.com/office/drawing/2010/main" xmlns="" w="9525">
+                <a14:hiddenLine xmlns="" xmlns:a14="http://schemas.microsoft.com/office/drawing/2010/main" w="9525">
                   <a:solidFill>
                     <a:srgbClr val="000000"/>
                   </a:solidFill>
@@ -1582,7 +1582,7 @@
             </a:ln>
             <a:extLst>
               <a:ext uri="{91240B29-F687-4f45-9708-019B960494DF}">
-                <a14:hiddenLine xmlns:a14="http://schemas.microsoft.com/office/drawing/2010/main" xmlns="" w="9525">
+                <a14:hiddenLine xmlns="" xmlns:a14="http://schemas.microsoft.com/office/drawing/2010/main" w="9525">
                   <a:solidFill>
                     <a:srgbClr val="000000"/>
                   </a:solidFill>
@@ -1644,7 +1644,7 @@
             </a:ln>
             <a:extLst>
               <a:ext uri="{91240B29-F687-4f45-9708-019B960494DF}">
-                <a14:hiddenLine xmlns:a14="http://schemas.microsoft.com/office/drawing/2010/main" xmlns="" w="9525">
+                <a14:hiddenLine xmlns="" xmlns:a14="http://schemas.microsoft.com/office/drawing/2010/main" w="9525">
                   <a:solidFill>
                     <a:srgbClr val="000000"/>
                   </a:solidFill>
@@ -1734,7 +1734,7 @@
             </a:ln>
             <a:extLst>
               <a:ext uri="{91240B29-F687-4f45-9708-019B960494DF}">
-                <a14:hiddenLine xmlns:a14="http://schemas.microsoft.com/office/drawing/2010/main" xmlns="" w="9525">
+                <a14:hiddenLine xmlns="" xmlns:a14="http://schemas.microsoft.com/office/drawing/2010/main" w="9525">
                   <a:solidFill>
                     <a:srgbClr val="000000"/>
                   </a:solidFill>
@@ -1824,7 +1824,7 @@
             </a:ln>
             <a:extLst>
               <a:ext uri="{91240B29-F687-4f45-9708-019B960494DF}">
-                <a14:hiddenLine xmlns:a14="http://schemas.microsoft.com/office/drawing/2010/main" xmlns="" w="9525">
+                <a14:hiddenLine xmlns="" xmlns:a14="http://schemas.microsoft.com/office/drawing/2010/main" w="9525">
                   <a:solidFill>
                     <a:srgbClr val="000000"/>
                   </a:solidFill>
@@ -1886,7 +1886,7 @@
             </a:ln>
             <a:extLst>
               <a:ext uri="{91240B29-F687-4f45-9708-019B960494DF}">
-                <a14:hiddenLine xmlns:a14="http://schemas.microsoft.com/office/drawing/2010/main" xmlns="" w="9525">
+                <a14:hiddenLine xmlns="" xmlns:a14="http://schemas.microsoft.com/office/drawing/2010/main" w="9525">
                   <a:solidFill>
                     <a:srgbClr val="000000"/>
                   </a:solidFill>
@@ -1976,7 +1976,7 @@
             </a:ln>
             <a:extLst>
               <a:ext uri="{91240B29-F687-4f45-9708-019B960494DF}">
-                <a14:hiddenLine xmlns:a14="http://schemas.microsoft.com/office/drawing/2010/main" xmlns="" w="9525">
+                <a14:hiddenLine xmlns="" xmlns:a14="http://schemas.microsoft.com/office/drawing/2010/main" w="9525">
                   <a:solidFill>
                     <a:srgbClr val="000000"/>
                   </a:solidFill>
@@ -2066,7 +2066,7 @@
             </a:ln>
             <a:extLst>
               <a:ext uri="{91240B29-F687-4f45-9708-019B960494DF}">
-                <a14:hiddenLine xmlns:a14="http://schemas.microsoft.com/office/drawing/2010/main" xmlns="" w="9525">
+                <a14:hiddenLine xmlns="" xmlns:a14="http://schemas.microsoft.com/office/drawing/2010/main" w="9525">
                   <a:solidFill>
                     <a:srgbClr val="000000"/>
                   </a:solidFill>
@@ -2122,7 +2122,7 @@
             </a:ln>
             <a:extLst>
               <a:ext uri="{91240B29-F687-4f45-9708-019B960494DF}">
-                <a14:hiddenLine xmlns:a14="http://schemas.microsoft.com/office/drawing/2010/main" xmlns="" w="9525">
+                <a14:hiddenLine xmlns="" xmlns:a14="http://schemas.microsoft.com/office/drawing/2010/main" w="9525">
                   <a:solidFill>
                     <a:srgbClr val="000000"/>
                   </a:solidFill>
@@ -2212,7 +2212,7 @@
             </a:ln>
             <a:extLst>
               <a:ext uri="{91240B29-F687-4f45-9708-019B960494DF}">
-                <a14:hiddenLine xmlns:a14="http://schemas.microsoft.com/office/drawing/2010/main" xmlns="" w="9525">
+                <a14:hiddenLine xmlns="" xmlns:a14="http://schemas.microsoft.com/office/drawing/2010/main" w="9525">
                   <a:solidFill>
                     <a:srgbClr val="000000"/>
                   </a:solidFill>
@@ -2268,7 +2268,7 @@
             </a:ln>
             <a:extLst>
               <a:ext uri="{91240B29-F687-4f45-9708-019B960494DF}">
-                <a14:hiddenLine xmlns:a14="http://schemas.microsoft.com/office/drawing/2010/main" xmlns="" w="9525">
+                <a14:hiddenLine xmlns="" xmlns:a14="http://schemas.microsoft.com/office/drawing/2010/main" w="9525">
                   <a:solidFill>
                     <a:srgbClr val="000000"/>
                   </a:solidFill>
@@ -2358,7 +2358,7 @@
             </a:ln>
             <a:extLst>
               <a:ext uri="{91240B29-F687-4f45-9708-019B960494DF}">
-                <a14:hiddenLine xmlns:a14="http://schemas.microsoft.com/office/drawing/2010/main" xmlns="" w="9525">
+                <a14:hiddenLine xmlns="" xmlns:a14="http://schemas.microsoft.com/office/drawing/2010/main" w="9525">
                   <a:solidFill>
                     <a:srgbClr val="000000"/>
                   </a:solidFill>
@@ -2426,7 +2426,7 @@
             </a:ln>
             <a:extLst>
               <a:ext uri="{91240B29-F687-4f45-9708-019B960494DF}">
-                <a14:hiddenLine xmlns:a14="http://schemas.microsoft.com/office/drawing/2010/main" xmlns="" w="9525">
+                <a14:hiddenLine xmlns="" xmlns:a14="http://schemas.microsoft.com/office/drawing/2010/main" w="9525">
                   <a:solidFill>
                     <a:srgbClr val="000000"/>
                   </a:solidFill>
@@ -2516,7 +2516,7 @@
             </a:ln>
             <a:extLst>
               <a:ext uri="{91240B29-F687-4f45-9708-019B960494DF}">
-                <a14:hiddenLine xmlns:a14="http://schemas.microsoft.com/office/drawing/2010/main" xmlns="" w="9525">
+                <a14:hiddenLine xmlns="" xmlns:a14="http://schemas.microsoft.com/office/drawing/2010/main" w="9525">
                   <a:solidFill>
                     <a:srgbClr val="000000"/>
                   </a:solidFill>
@@ -2584,7 +2584,7 @@
             </a:ln>
             <a:extLst>
               <a:ext uri="{91240B29-F687-4f45-9708-019B960494DF}">
-                <a14:hiddenLine xmlns:a14="http://schemas.microsoft.com/office/drawing/2010/main" xmlns="" w="9525">
+                <a14:hiddenLine xmlns="" xmlns:a14="http://schemas.microsoft.com/office/drawing/2010/main" w="9525">
                   <a:solidFill>
                     <a:srgbClr val="000000"/>
                   </a:solidFill>
@@ -2674,7 +2674,7 @@
             </a:ln>
             <a:extLst>
               <a:ext uri="{91240B29-F687-4f45-9708-019B960494DF}">
-                <a14:hiddenLine xmlns:a14="http://schemas.microsoft.com/office/drawing/2010/main" xmlns="" w="9525">
+                <a14:hiddenLine xmlns="" xmlns:a14="http://schemas.microsoft.com/office/drawing/2010/main" w="9525">
                   <a:solidFill>
                     <a:srgbClr val="000000"/>
                   </a:solidFill>
@@ -2708,7 +2708,7 @@
             </a:ln>
             <a:extLst>
               <a:ext uri="{91240B29-F687-4f45-9708-019B960494DF}">
-                <a14:hiddenLine xmlns:a14="http://schemas.microsoft.com/office/drawing/2010/main" xmlns="" w="9525">
+                <a14:hiddenLine xmlns="" xmlns:a14="http://schemas.microsoft.com/office/drawing/2010/main" w="9525">
                   <a:solidFill>
                     <a:srgbClr val="000000"/>
                   </a:solidFill>
@@ -2798,7 +2798,7 @@
             </a:ln>
             <a:extLst>
               <a:ext uri="{91240B29-F687-4f45-9708-019B960494DF}">
-                <a14:hiddenLine xmlns:a14="http://schemas.microsoft.com/office/drawing/2010/main" xmlns="" w="9525">
+                <a14:hiddenLine xmlns="" xmlns:a14="http://schemas.microsoft.com/office/drawing/2010/main" w="9525">
                   <a:solidFill>
                     <a:srgbClr val="000000"/>
                   </a:solidFill>
@@ -2860,7 +2860,7 @@
             </a:ln>
             <a:extLst>
               <a:ext uri="{91240B29-F687-4f45-9708-019B960494DF}">
-                <a14:hiddenLine xmlns:a14="http://schemas.microsoft.com/office/drawing/2010/main" xmlns="" w="9525">
+                <a14:hiddenLine xmlns="" xmlns:a14="http://schemas.microsoft.com/office/drawing/2010/main" w="9525">
                   <a:solidFill>
                     <a:srgbClr val="000000"/>
                   </a:solidFill>
@@ -2922,7 +2922,7 @@
             </a:ln>
             <a:extLst>
               <a:ext uri="{91240B29-F687-4f45-9708-019B960494DF}">
-                <a14:hiddenLine xmlns:a14="http://schemas.microsoft.com/office/drawing/2010/main" xmlns="" w="9525">
+                <a14:hiddenLine xmlns="" xmlns:a14="http://schemas.microsoft.com/office/drawing/2010/main" w="9525">
                   <a:solidFill>
                     <a:srgbClr val="000000"/>
                   </a:solidFill>
@@ -3012,7 +3012,7 @@
             </a:ln>
             <a:extLst>
               <a:ext uri="{91240B29-F687-4f45-9708-019B960494DF}">
-                <a14:hiddenLine xmlns:a14="http://schemas.microsoft.com/office/drawing/2010/main" xmlns="" w="9525">
+                <a14:hiddenLine xmlns="" xmlns:a14="http://schemas.microsoft.com/office/drawing/2010/main" w="9525">
                   <a:solidFill>
                     <a:srgbClr val="000000"/>
                   </a:solidFill>
@@ -3080,7 +3080,7 @@
             </a:ln>
             <a:extLst>
               <a:ext uri="{91240B29-F687-4f45-9708-019B960494DF}">
-                <a14:hiddenLine xmlns:a14="http://schemas.microsoft.com/office/drawing/2010/main" xmlns="" w="9525">
+                <a14:hiddenLine xmlns="" xmlns:a14="http://schemas.microsoft.com/office/drawing/2010/main" w="9525">
                   <a:solidFill>
                     <a:srgbClr val="000000"/>
                   </a:solidFill>
@@ -3142,7 +3142,7 @@
             </a:ln>
             <a:extLst>
               <a:ext uri="{91240B29-F687-4f45-9708-019B960494DF}">
-                <a14:hiddenLine xmlns:a14="http://schemas.microsoft.com/office/drawing/2010/main" xmlns="" w="9525">
+                <a14:hiddenLine xmlns="" xmlns:a14="http://schemas.microsoft.com/office/drawing/2010/main" w="9525">
                   <a:solidFill>
                     <a:srgbClr val="000000"/>
                   </a:solidFill>
@@ -3232,7 +3232,7 @@
             </a:ln>
             <a:extLst>
               <a:ext uri="{91240B29-F687-4f45-9708-019B960494DF}">
-                <a14:hiddenLine xmlns:a14="http://schemas.microsoft.com/office/drawing/2010/main" xmlns="" w="9525">
+                <a14:hiddenLine xmlns="" xmlns:a14="http://schemas.microsoft.com/office/drawing/2010/main" w="9525">
                   <a:solidFill>
                     <a:srgbClr val="000000"/>
                   </a:solidFill>
@@ -3294,7 +3294,7 @@
             </a:ln>
             <a:extLst>
               <a:ext uri="{91240B29-F687-4f45-9708-019B960494DF}">
-                <a14:hiddenLine xmlns:a14="http://schemas.microsoft.com/office/drawing/2010/main" xmlns="" w="9525">
+                <a14:hiddenLine xmlns="" xmlns:a14="http://schemas.microsoft.com/office/drawing/2010/main" w="9525">
                   <a:solidFill>
                     <a:srgbClr val="000000"/>
                   </a:solidFill>
@@ -3384,7 +3384,7 @@
             </a:ln>
             <a:extLst>
               <a:ext uri="{91240B29-F687-4f45-9708-019B960494DF}">
-                <a14:hiddenLine xmlns:a14="http://schemas.microsoft.com/office/drawing/2010/main" xmlns="" w="9525">
+                <a14:hiddenLine xmlns="" xmlns:a14="http://schemas.microsoft.com/office/drawing/2010/main" w="9525">
                   <a:solidFill>
                     <a:srgbClr val="000000"/>
                   </a:solidFill>
@@ -3446,7 +3446,7 @@
             </a:ln>
             <a:extLst>
               <a:ext uri="{91240B29-F687-4f45-9708-019B960494DF}">
-                <a14:hiddenLine xmlns:a14="http://schemas.microsoft.com/office/drawing/2010/main" xmlns="" w="9525">
+                <a14:hiddenLine xmlns="" xmlns:a14="http://schemas.microsoft.com/office/drawing/2010/main" w="9525">
                   <a:solidFill>
                     <a:srgbClr val="000000"/>
                   </a:solidFill>
@@ -3536,7 +3536,7 @@
             </a:ln>
             <a:extLst>
               <a:ext uri="{91240B29-F687-4f45-9708-019B960494DF}">
-                <a14:hiddenLine xmlns:a14="http://schemas.microsoft.com/office/drawing/2010/main" xmlns="" w="9525">
+                <a14:hiddenLine xmlns="" xmlns:a14="http://schemas.microsoft.com/office/drawing/2010/main" w="9525">
                   <a:solidFill>
                     <a:srgbClr val="000000"/>
                   </a:solidFill>
@@ -3570,7 +3570,7 @@
             </a:ln>
             <a:extLst>
               <a:ext uri="{91240B29-F687-4f45-9708-019B960494DF}">
-                <a14:hiddenLine xmlns:a14="http://schemas.microsoft.com/office/drawing/2010/main" xmlns="" w="9525">
+                <a14:hiddenLine xmlns="" xmlns:a14="http://schemas.microsoft.com/office/drawing/2010/main" w="9525">
                   <a:solidFill>
                     <a:srgbClr val="000000"/>
                   </a:solidFill>
@@ -3635,7 +3635,7 @@
             </a:ln>
             <a:extLst>
               <a:ext uri="{91240B29-F687-4f45-9708-019B960494DF}">
-                <a14:hiddenLine xmlns:a14="http://schemas.microsoft.com/office/drawing/2010/main" xmlns="" w="9525">
+                <a14:hiddenLine xmlns="" xmlns:a14="http://schemas.microsoft.com/office/drawing/2010/main" w="9525">
                   <a:solidFill>
                     <a:srgbClr val="000000"/>
                   </a:solidFill>
@@ -3725,7 +3725,7 @@
             </a:ln>
             <a:extLst>
               <a:ext uri="{91240B29-F687-4f45-9708-019B960494DF}">
-                <a14:hiddenLine xmlns:a14="http://schemas.microsoft.com/office/drawing/2010/main" xmlns="" w="9525">
+                <a14:hiddenLine xmlns="" xmlns:a14="http://schemas.microsoft.com/office/drawing/2010/main" w="9525">
                   <a:solidFill>
                     <a:srgbClr val="000000"/>
                   </a:solidFill>
@@ -3787,7 +3787,7 @@
             </a:ln>
             <a:extLst>
               <a:ext uri="{91240B29-F687-4f45-9708-019B960494DF}">
-                <a14:hiddenLine xmlns:a14="http://schemas.microsoft.com/office/drawing/2010/main" xmlns="" w="9525">
+                <a14:hiddenLine xmlns="" xmlns:a14="http://schemas.microsoft.com/office/drawing/2010/main" w="9525">
                   <a:solidFill>
                     <a:srgbClr val="000000"/>
                   </a:solidFill>
@@ -3877,7 +3877,7 @@
             </a:ln>
             <a:extLst>
               <a:ext uri="{91240B29-F687-4f45-9708-019B960494DF}">
-                <a14:hiddenLine xmlns:a14="http://schemas.microsoft.com/office/drawing/2010/main" xmlns="" w="9525">
+                <a14:hiddenLine xmlns="" xmlns:a14="http://schemas.microsoft.com/office/drawing/2010/main" w="9525">
                   <a:solidFill>
                     <a:srgbClr val="000000"/>
                   </a:solidFill>
@@ -3967,7 +3967,7 @@
             </a:ln>
             <a:extLst>
               <a:ext uri="{91240B29-F687-4f45-9708-019B960494DF}">
-                <a14:hiddenLine xmlns:a14="http://schemas.microsoft.com/office/drawing/2010/main" xmlns="" w="9525">
+                <a14:hiddenLine xmlns="" xmlns:a14="http://schemas.microsoft.com/office/drawing/2010/main" w="9525">
                   <a:solidFill>
                     <a:srgbClr val="000000"/>
                   </a:solidFill>
@@ -4032,7 +4032,7 @@
             </a:ln>
             <a:extLst>
               <a:ext uri="{91240B29-F687-4f45-9708-019B960494DF}">
-                <a14:hiddenLine xmlns:a14="http://schemas.microsoft.com/office/drawing/2010/main" xmlns="" w="9525">
+                <a14:hiddenLine xmlns="" xmlns:a14="http://schemas.microsoft.com/office/drawing/2010/main" w="9525">
                   <a:solidFill>
                     <a:srgbClr val="000000"/>
                   </a:solidFill>
@@ -4094,7 +4094,7 @@
             </a:ln>
             <a:extLst>
               <a:ext uri="{91240B29-F687-4f45-9708-019B960494DF}">
-                <a14:hiddenLine xmlns:a14="http://schemas.microsoft.com/office/drawing/2010/main" xmlns="" w="9525">
+                <a14:hiddenLine xmlns="" xmlns:a14="http://schemas.microsoft.com/office/drawing/2010/main" w="9525">
                   <a:solidFill>
                     <a:srgbClr val="000000"/>
                   </a:solidFill>
@@ -4184,7 +4184,7 @@
             </a:ln>
             <a:extLst>
               <a:ext uri="{91240B29-F687-4f45-9708-019B960494DF}">
-                <a14:hiddenLine xmlns:a14="http://schemas.microsoft.com/office/drawing/2010/main" xmlns="" w="9525">
+                <a14:hiddenLine xmlns="" xmlns:a14="http://schemas.microsoft.com/office/drawing/2010/main" w="9525">
                   <a:solidFill>
                     <a:srgbClr val="000000"/>
                   </a:solidFill>
@@ -4274,7 +4274,7 @@
             </a:ln>
             <a:extLst>
               <a:ext uri="{91240B29-F687-4f45-9708-019B960494DF}">
-                <a14:hiddenLine xmlns:a14="http://schemas.microsoft.com/office/drawing/2010/main" xmlns="" w="9525">
+                <a14:hiddenLine xmlns="" xmlns:a14="http://schemas.microsoft.com/office/drawing/2010/main" w="9525">
                   <a:solidFill>
                     <a:srgbClr val="000000"/>
                   </a:solidFill>
@@ -4336,7 +4336,7 @@
             </a:ln>
             <a:extLst>
               <a:ext uri="{91240B29-F687-4f45-9708-019B960494DF}">
-                <a14:hiddenLine xmlns:a14="http://schemas.microsoft.com/office/drawing/2010/main" xmlns="" w="9525">
+                <a14:hiddenLine xmlns="" xmlns:a14="http://schemas.microsoft.com/office/drawing/2010/main" w="9525">
                   <a:solidFill>
                     <a:srgbClr val="000000"/>
                   </a:solidFill>
@@ -4456,7 +4456,7 @@
             </a:ln>
             <a:extLst>
               <a:ext uri="{91240B29-F687-4f45-9708-019B960494DF}">
-                <a14:hiddenLine xmlns:a14="http://schemas.microsoft.com/office/drawing/2010/main" xmlns="" w="9525">
+                <a14:hiddenLine xmlns="" xmlns:a14="http://schemas.microsoft.com/office/drawing/2010/main" w="9525">
                   <a:solidFill>
                     <a:srgbClr val="000000"/>
                   </a:solidFill>
@@ -4524,7 +4524,7 @@
             </a:ln>
             <a:extLst>
               <a:ext uri="{91240B29-F687-4f45-9708-019B960494DF}">
-                <a14:hiddenLine xmlns:a14="http://schemas.microsoft.com/office/drawing/2010/main" xmlns="" w="9525">
+                <a14:hiddenLine xmlns="" xmlns:a14="http://schemas.microsoft.com/office/drawing/2010/main" w="9525">
                   <a:solidFill>
                     <a:srgbClr val="000000"/>
                   </a:solidFill>
@@ -4614,7 +4614,7 @@
             </a:ln>
             <a:extLst>
               <a:ext uri="{91240B29-F687-4f45-9708-019B960494DF}">
-                <a14:hiddenLine xmlns:a14="http://schemas.microsoft.com/office/drawing/2010/main" xmlns="" w="9525">
+                <a14:hiddenLine xmlns="" xmlns:a14="http://schemas.microsoft.com/office/drawing/2010/main" w="9525">
                   <a:solidFill>
                     <a:srgbClr val="000000"/>
                   </a:solidFill>
@@ -4754,7 +4754,7 @@
           <a:p>
             <a:fld id="{2E6956D0-FF82-46DA-9F38-706DC86F0D56}" type="datetime1">
               <a:rPr lang="en-US" smtClean="0"/>
-              <a:t>4/17/2025</a:t>
+              <a:t>4/18/2025</a:t>
             </a:fld>
             <a:endParaRPr lang="en-US" dirty="0"/>
           </a:p>
@@ -5049,7 +5049,7 @@
           <a:p>
             <a:fld id="{B29A0609-7FEE-4DC0-9780-D623E024975E}" type="datetime1">
               <a:rPr lang="en-US" smtClean="0"/>
-              <a:t>4/17/2025</a:t>
+              <a:t>4/18/2025</a:t>
             </a:fld>
             <a:endParaRPr lang="en-US" dirty="0"/>
           </a:p>
@@ -5243,7 +5243,7 @@
           <a:p>
             <a:fld id="{D8595C36-295C-44A6-AB85-859B320446F8}" type="datetime1">
               <a:rPr lang="en-US" smtClean="0"/>
-              <a:t>4/17/2025</a:t>
+              <a:t>4/18/2025</a:t>
             </a:fld>
             <a:endParaRPr lang="en-US" dirty="0"/>
           </a:p>
@@ -5504,7 +5504,7 @@
           <a:p>
             <a:fld id="{99F217E4-37B9-4791-A38E-D8BC4AED1ACB}" type="datetime1">
               <a:rPr lang="en-US" smtClean="0"/>
-              <a:t>4/17/2025</a:t>
+              <a:t>4/18/2025</a:t>
             </a:fld>
             <a:endParaRPr lang="en-US" dirty="0"/>
           </a:p>
@@ -5937,7 +5937,7 @@
           <a:p>
             <a:fld id="{7326BBBD-F342-45E3-84E1-84BE66868B86}" type="datetime1">
               <a:rPr lang="en-US" smtClean="0"/>
-              <a:t>4/17/2025</a:t>
+              <a:t>4/18/2025</a:t>
             </a:fld>
             <a:endParaRPr lang="en-US" dirty="0"/>
           </a:p>
@@ -6482,7 +6482,7 @@
           <a:p>
             <a:fld id="{BF8B92E3-5D56-4D9D-A69E-DE111053FD9E}" type="datetime1">
               <a:rPr lang="en-US" smtClean="0"/>
-              <a:t>4/17/2025</a:t>
+              <a:t>4/18/2025</a:t>
             </a:fld>
             <a:endParaRPr lang="en-US" dirty="0"/>
           </a:p>
@@ -7200,7 +7200,7 @@
           <a:p>
             <a:fld id="{5530DBAB-C152-4B13-894C-B845E59C3017}" type="datetime1">
               <a:rPr lang="en-US" smtClean="0"/>
-              <a:t>4/17/2025</a:t>
+              <a:t>4/18/2025</a:t>
             </a:fld>
             <a:endParaRPr lang="en-US" dirty="0"/>
           </a:p>
@@ -7368,7 +7368,7 @@
           <a:p>
             <a:fld id="{5A1A901B-AC15-4CE2-B187-E1906D80C40A}" type="datetime1">
               <a:rPr lang="en-US" smtClean="0"/>
-              <a:t>4/17/2025</a:t>
+              <a:t>4/18/2025</a:t>
             </a:fld>
             <a:endParaRPr lang="en-US" dirty="0"/>
           </a:p>
@@ -7546,7 +7546,7 @@
           <a:p>
             <a:fld id="{173BF05D-F707-4D33-BC3D-A422F7F8BD2C}" type="datetime1">
               <a:rPr lang="en-US" smtClean="0"/>
-              <a:t>4/17/2025</a:t>
+              <a:t>4/18/2025</a:t>
             </a:fld>
             <a:endParaRPr lang="en-US" dirty="0"/>
           </a:p>
@@ -7714,7 +7714,7 @@
           <a:p>
             <a:fld id="{8EE2707C-063E-46D3-BE25-A9A8D80E43A6}" type="datetime1">
               <a:rPr lang="en-US" smtClean="0"/>
-              <a:t>4/17/2025</a:t>
+              <a:t>4/18/2025</a:t>
             </a:fld>
             <a:endParaRPr lang="en-US" dirty="0"/>
           </a:p>
@@ -7967,7 +7967,7 @@
           <a:p>
             <a:fld id="{DE2BBCB1-03A1-4E25-BBBE-484FF07E9034}" type="datetime1">
               <a:rPr lang="en-US" smtClean="0"/>
-              <a:t>4/17/2025</a:t>
+              <a:t>4/18/2025</a:t>
             </a:fld>
             <a:endParaRPr lang="en-US" dirty="0"/>
           </a:p>
@@ -8197,7 +8197,7 @@
           <a:p>
             <a:fld id="{32AE1E5B-2754-4F28-8433-77BB8DA5C10A}" type="datetime1">
               <a:rPr lang="en-US" smtClean="0"/>
-              <a:t>4/17/2025</a:t>
+              <a:t>4/18/2025</a:t>
             </a:fld>
             <a:endParaRPr lang="en-US" dirty="0"/>
           </a:p>
@@ -8576,7 +8576,7 @@
           <a:p>
             <a:fld id="{A949E13A-A720-4FA7-B4C3-D48667EC44AE}" type="datetime1">
               <a:rPr lang="en-US" smtClean="0"/>
-              <a:t>4/17/2025</a:t>
+              <a:t>4/18/2025</a:t>
             </a:fld>
             <a:endParaRPr lang="en-US" dirty="0"/>
           </a:p>
@@ -8692,7 +8692,7 @@
           <a:p>
             <a:fld id="{8907D086-5A12-4193-995F-F84EC02B1AD8}" type="datetime1">
               <a:rPr lang="en-US" smtClean="0"/>
-              <a:t>4/17/2025</a:t>
+              <a:t>4/18/2025</a:t>
             </a:fld>
             <a:endParaRPr lang="en-US" dirty="0"/>
           </a:p>
@@ -8785,7 +8785,7 @@
           <a:p>
             <a:fld id="{AE68C3A2-0540-4972-9AF7-3C65A04AEEB6}" type="datetime1">
               <a:rPr lang="en-US" smtClean="0"/>
-              <a:t>4/17/2025</a:t>
+              <a:t>4/18/2025</a:t>
             </a:fld>
             <a:endParaRPr lang="en-US" dirty="0"/>
           </a:p>
@@ -9032,7 +9032,7 @@
           <a:p>
             <a:fld id="{E1972B15-44AC-4DC1-B1E2-4E855788D9BC}" type="datetime1">
               <a:rPr lang="en-US" smtClean="0"/>
-              <a:t>4/17/2025</a:t>
+              <a:t>4/18/2025</a:t>
             </a:fld>
             <a:endParaRPr lang="en-US" dirty="0"/>
           </a:p>
@@ -9310,7 +9310,7 @@
           <a:p>
             <a:fld id="{35586A4F-619C-4F02-A396-839181AC6BB4}" type="datetime1">
               <a:rPr lang="en-US" smtClean="0"/>
-              <a:t>4/17/2025</a:t>
+              <a:t>4/18/2025</a:t>
             </a:fld>
             <a:endParaRPr lang="en-US" dirty="0"/>
           </a:p>
@@ -9424,7 +9424,7 @@
           <a:noFill/>
           <a:extLst>
             <a:ext uri="{909E8E84-426E-40dd-AFC4-6F175D3DCCD1}">
-              <a14:hiddenFill xmlns:a14="http://schemas.microsoft.com/office/drawing/2010/main" xmlns="">
+              <a14:hiddenFill xmlns="" xmlns:a14="http://schemas.microsoft.com/office/drawing/2010/main">
                 <a:solidFill>
                   <a:srgbClr val="FFFFFF"/>
                 </a:solidFill>
@@ -9498,7 +9498,7 @@
               </a:ln>
               <a:extLst>
                 <a:ext uri="{91240B29-F687-4f45-9708-019B960494DF}">
-                  <a14:hiddenLine xmlns:a14="http://schemas.microsoft.com/office/drawing/2010/main" xmlns="" w="9525">
+                  <a14:hiddenLine xmlns="" xmlns:a14="http://schemas.microsoft.com/office/drawing/2010/main" w="9525">
                     <a:solidFill>
                       <a:srgbClr val="000000"/>
                     </a:solidFill>
@@ -9588,7 +9588,7 @@
               </a:ln>
               <a:extLst>
                 <a:ext uri="{91240B29-F687-4f45-9708-019B960494DF}">
-                  <a14:hiddenLine xmlns:a14="http://schemas.microsoft.com/office/drawing/2010/main" xmlns="" w="9525">
+                  <a14:hiddenLine xmlns="" xmlns:a14="http://schemas.microsoft.com/office/drawing/2010/main" w="9525">
                     <a:solidFill>
                       <a:srgbClr val="000000"/>
                     </a:solidFill>
@@ -9678,7 +9678,7 @@
               </a:ln>
               <a:extLst>
                 <a:ext uri="{91240B29-F687-4f45-9708-019B960494DF}">
-                  <a14:hiddenLine xmlns:a14="http://schemas.microsoft.com/office/drawing/2010/main" xmlns="" w="9525">
+                  <a14:hiddenLine xmlns="" xmlns:a14="http://schemas.microsoft.com/office/drawing/2010/main" w="9525">
                     <a:solidFill>
                       <a:srgbClr val="000000"/>
                     </a:solidFill>
@@ -9740,7 +9740,7 @@
               </a:ln>
               <a:extLst>
                 <a:ext uri="{91240B29-F687-4f45-9708-019B960494DF}">
-                  <a14:hiddenLine xmlns:a14="http://schemas.microsoft.com/office/drawing/2010/main" xmlns="" w="9525">
+                  <a14:hiddenLine xmlns="" xmlns:a14="http://schemas.microsoft.com/office/drawing/2010/main" w="9525">
                     <a:solidFill>
                       <a:srgbClr val="000000"/>
                     </a:solidFill>
@@ -9830,7 +9830,7 @@
               </a:ln>
               <a:extLst>
                 <a:ext uri="{91240B29-F687-4f45-9708-019B960494DF}">
-                  <a14:hiddenLine xmlns:a14="http://schemas.microsoft.com/office/drawing/2010/main" xmlns="" w="9525">
+                  <a14:hiddenLine xmlns="" xmlns:a14="http://schemas.microsoft.com/office/drawing/2010/main" w="9525">
                     <a:solidFill>
                       <a:srgbClr val="000000"/>
                     </a:solidFill>
@@ -9892,7 +9892,7 @@
               </a:ln>
               <a:extLst>
                 <a:ext uri="{91240B29-F687-4f45-9708-019B960494DF}">
-                  <a14:hiddenLine xmlns:a14="http://schemas.microsoft.com/office/drawing/2010/main" xmlns="" w="9525">
+                  <a14:hiddenLine xmlns="" xmlns:a14="http://schemas.microsoft.com/office/drawing/2010/main" w="9525">
                     <a:solidFill>
                       <a:srgbClr val="000000"/>
                     </a:solidFill>
@@ -9954,7 +9954,7 @@
               </a:ln>
               <a:extLst>
                 <a:ext uri="{91240B29-F687-4f45-9708-019B960494DF}">
-                  <a14:hiddenLine xmlns:a14="http://schemas.microsoft.com/office/drawing/2010/main" xmlns="" w="9525">
+                  <a14:hiddenLine xmlns="" xmlns:a14="http://schemas.microsoft.com/office/drawing/2010/main" w="9525">
                     <a:solidFill>
                       <a:srgbClr val="000000"/>
                     </a:solidFill>
@@ -10044,7 +10044,7 @@
               </a:ln>
               <a:extLst>
                 <a:ext uri="{91240B29-F687-4f45-9708-019B960494DF}">
-                  <a14:hiddenLine xmlns:a14="http://schemas.microsoft.com/office/drawing/2010/main" xmlns="" w="9525">
+                  <a14:hiddenLine xmlns="" xmlns:a14="http://schemas.microsoft.com/office/drawing/2010/main" w="9525">
                     <a:solidFill>
                       <a:srgbClr val="000000"/>
                     </a:solidFill>
@@ -10134,7 +10134,7 @@
               </a:ln>
               <a:extLst>
                 <a:ext uri="{91240B29-F687-4f45-9708-019B960494DF}">
-                  <a14:hiddenLine xmlns:a14="http://schemas.microsoft.com/office/drawing/2010/main" xmlns="" w="9525">
+                  <a14:hiddenLine xmlns="" xmlns:a14="http://schemas.microsoft.com/office/drawing/2010/main" w="9525">
                     <a:solidFill>
                       <a:srgbClr val="000000"/>
                     </a:solidFill>
@@ -10196,7 +10196,7 @@
               </a:ln>
               <a:extLst>
                 <a:ext uri="{91240B29-F687-4f45-9708-019B960494DF}">
-                  <a14:hiddenLine xmlns:a14="http://schemas.microsoft.com/office/drawing/2010/main" xmlns="" w="9525">
+                  <a14:hiddenLine xmlns="" xmlns:a14="http://schemas.microsoft.com/office/drawing/2010/main" w="9525">
                     <a:solidFill>
                       <a:srgbClr val="000000"/>
                     </a:solidFill>
@@ -10306,7 +10306,7 @@
               </a:ln>
               <a:extLst>
                 <a:ext uri="{91240B29-F687-4f45-9708-019B960494DF}">
-                  <a14:hiddenLine xmlns:a14="http://schemas.microsoft.com/office/drawing/2010/main" xmlns="" w="9525">
+                  <a14:hiddenLine xmlns="" xmlns:a14="http://schemas.microsoft.com/office/drawing/2010/main" w="9525">
                     <a:solidFill>
                       <a:srgbClr val="000000"/>
                     </a:solidFill>
@@ -10390,7 +10390,7 @@
               </a:ln>
               <a:extLst>
                 <a:ext uri="{91240B29-F687-4f45-9708-019B960494DF}">
-                  <a14:hiddenLine xmlns:a14="http://schemas.microsoft.com/office/drawing/2010/main" xmlns="" w="9525">
+                  <a14:hiddenLine xmlns="" xmlns:a14="http://schemas.microsoft.com/office/drawing/2010/main" w="9525">
                     <a:solidFill>
                       <a:srgbClr val="000000"/>
                     </a:solidFill>
@@ -10452,7 +10452,7 @@
               </a:ln>
               <a:extLst>
                 <a:ext uri="{91240B29-F687-4f45-9708-019B960494DF}">
-                  <a14:hiddenLine xmlns:a14="http://schemas.microsoft.com/office/drawing/2010/main" xmlns="" w="9525">
+                  <a14:hiddenLine xmlns="" xmlns:a14="http://schemas.microsoft.com/office/drawing/2010/main" w="9525">
                     <a:solidFill>
                       <a:srgbClr val="000000"/>
                     </a:solidFill>
@@ -10514,7 +10514,7 @@
               </a:ln>
               <a:extLst>
                 <a:ext uri="{91240B29-F687-4f45-9708-019B960494DF}">
-                  <a14:hiddenLine xmlns:a14="http://schemas.microsoft.com/office/drawing/2010/main" xmlns="" w="9525">
+                  <a14:hiddenLine xmlns="" xmlns:a14="http://schemas.microsoft.com/office/drawing/2010/main" w="9525">
                     <a:solidFill>
                       <a:srgbClr val="000000"/>
                     </a:solidFill>
@@ -10604,7 +10604,7 @@
               </a:ln>
               <a:extLst>
                 <a:ext uri="{91240B29-F687-4f45-9708-019B960494DF}">
-                  <a14:hiddenLine xmlns:a14="http://schemas.microsoft.com/office/drawing/2010/main" xmlns="" w="9525">
+                  <a14:hiddenLine xmlns="" xmlns:a14="http://schemas.microsoft.com/office/drawing/2010/main" w="9525">
                     <a:solidFill>
                       <a:srgbClr val="000000"/>
                     </a:solidFill>
@@ -10638,7 +10638,7 @@
               </a:ln>
               <a:extLst>
                 <a:ext uri="{91240B29-F687-4f45-9708-019B960494DF}">
-                  <a14:hiddenLine xmlns:a14="http://schemas.microsoft.com/office/drawing/2010/main" xmlns="" w="9525">
+                  <a14:hiddenLine xmlns="" xmlns:a14="http://schemas.microsoft.com/office/drawing/2010/main" w="9525">
                     <a:solidFill>
                       <a:srgbClr val="000000"/>
                     </a:solidFill>
@@ -10703,7 +10703,7 @@
               </a:ln>
               <a:extLst>
                 <a:ext uri="{91240B29-F687-4f45-9708-019B960494DF}">
-                  <a14:hiddenLine xmlns:a14="http://schemas.microsoft.com/office/drawing/2010/main" xmlns="" w="9525">
+                  <a14:hiddenLine xmlns="" xmlns:a14="http://schemas.microsoft.com/office/drawing/2010/main" w="9525">
                     <a:solidFill>
                       <a:srgbClr val="000000"/>
                     </a:solidFill>
@@ -10793,7 +10793,7 @@
               </a:ln>
               <a:extLst>
                 <a:ext uri="{91240B29-F687-4f45-9708-019B960494DF}">
-                  <a14:hiddenLine xmlns:a14="http://schemas.microsoft.com/office/drawing/2010/main" xmlns="" w="9525">
+                  <a14:hiddenLine xmlns="" xmlns:a14="http://schemas.microsoft.com/office/drawing/2010/main" w="9525">
                     <a:solidFill>
                       <a:srgbClr val="000000"/>
                     </a:solidFill>
@@ -10855,7 +10855,7 @@
               </a:ln>
               <a:extLst>
                 <a:ext uri="{91240B29-F687-4f45-9708-019B960494DF}">
-                  <a14:hiddenLine xmlns:a14="http://schemas.microsoft.com/office/drawing/2010/main" xmlns="" w="9525">
+                  <a14:hiddenLine xmlns="" xmlns:a14="http://schemas.microsoft.com/office/drawing/2010/main" w="9525">
                     <a:solidFill>
                       <a:srgbClr val="000000"/>
                     </a:solidFill>
@@ -10945,7 +10945,7 @@
               </a:ln>
               <a:extLst>
                 <a:ext uri="{91240B29-F687-4f45-9708-019B960494DF}">
-                  <a14:hiddenLine xmlns:a14="http://schemas.microsoft.com/office/drawing/2010/main" xmlns="" w="9525">
+                  <a14:hiddenLine xmlns="" xmlns:a14="http://schemas.microsoft.com/office/drawing/2010/main" w="9525">
                     <a:solidFill>
                       <a:srgbClr val="000000"/>
                     </a:solidFill>
@@ -11010,7 +11010,7 @@
               </a:ln>
               <a:extLst>
                 <a:ext uri="{91240B29-F687-4f45-9708-019B960494DF}">
-                  <a14:hiddenLine xmlns:a14="http://schemas.microsoft.com/office/drawing/2010/main" xmlns="" w="9525">
+                  <a14:hiddenLine xmlns="" xmlns:a14="http://schemas.microsoft.com/office/drawing/2010/main" w="9525">
                     <a:solidFill>
                       <a:srgbClr val="000000"/>
                     </a:solidFill>
@@ -11072,7 +11072,7 @@
               </a:ln>
               <a:extLst>
                 <a:ext uri="{91240B29-F687-4f45-9708-019B960494DF}">
-                  <a14:hiddenLine xmlns:a14="http://schemas.microsoft.com/office/drawing/2010/main" xmlns="" w="9525">
+                  <a14:hiddenLine xmlns="" xmlns:a14="http://schemas.microsoft.com/office/drawing/2010/main" w="9525">
                     <a:solidFill>
                       <a:srgbClr val="000000"/>
                     </a:solidFill>
@@ -11162,7 +11162,7 @@
               </a:ln>
               <a:extLst>
                 <a:ext uri="{91240B29-F687-4f45-9708-019B960494DF}">
-                  <a14:hiddenLine xmlns:a14="http://schemas.microsoft.com/office/drawing/2010/main" xmlns="" w="9525">
+                  <a14:hiddenLine xmlns="" xmlns:a14="http://schemas.microsoft.com/office/drawing/2010/main" w="9525">
                     <a:solidFill>
                       <a:srgbClr val="000000"/>
                     </a:solidFill>
@@ -11252,7 +11252,7 @@
               </a:ln>
               <a:extLst>
                 <a:ext uri="{91240B29-F687-4f45-9708-019B960494DF}">
-                  <a14:hiddenLine xmlns:a14="http://schemas.microsoft.com/office/drawing/2010/main" xmlns="" w="9525">
+                  <a14:hiddenLine xmlns="" xmlns:a14="http://schemas.microsoft.com/office/drawing/2010/main" w="9525">
                     <a:solidFill>
                       <a:srgbClr val="000000"/>
                     </a:solidFill>
@@ -11317,7 +11317,7 @@
               </a:ln>
               <a:extLst>
                 <a:ext uri="{91240B29-F687-4f45-9708-019B960494DF}">
-                  <a14:hiddenLine xmlns:a14="http://schemas.microsoft.com/office/drawing/2010/main" xmlns="" w="9525">
+                  <a14:hiddenLine xmlns="" xmlns:a14="http://schemas.microsoft.com/office/drawing/2010/main" w="9525">
                     <a:solidFill>
                       <a:srgbClr val="000000"/>
                     </a:solidFill>
@@ -11437,7 +11437,7 @@
               </a:ln>
               <a:extLst>
                 <a:ext uri="{91240B29-F687-4f45-9708-019B960494DF}">
-                  <a14:hiddenLine xmlns:a14="http://schemas.microsoft.com/office/drawing/2010/main" xmlns="" w="9525">
+                  <a14:hiddenLine xmlns="" xmlns:a14="http://schemas.microsoft.com/office/drawing/2010/main" w="9525">
                     <a:solidFill>
                       <a:srgbClr val="000000"/>
                     </a:solidFill>
@@ -11535,7 +11535,7 @@
               </a:ln>
               <a:extLst>
                 <a:ext uri="{91240B29-F687-4f45-9708-019B960494DF}">
-                  <a14:hiddenLine xmlns:a14="http://schemas.microsoft.com/office/drawing/2010/main" xmlns="" w="9525">
+                  <a14:hiddenLine xmlns="" xmlns:a14="http://schemas.microsoft.com/office/drawing/2010/main" w="9525">
                     <a:solidFill>
                       <a:srgbClr val="000000"/>
                     </a:solidFill>
@@ -11650,7 +11650,7 @@
               </a:ln>
               <a:extLst>
                 <a:ext uri="{91240B29-F687-4f45-9708-019B960494DF}">
-                  <a14:hiddenLine xmlns:a14="http://schemas.microsoft.com/office/drawing/2010/main" xmlns="" w="9525">
+                  <a14:hiddenLine xmlns="" xmlns:a14="http://schemas.microsoft.com/office/drawing/2010/main" w="9525">
                     <a:solidFill>
                       <a:srgbClr val="000000"/>
                     </a:solidFill>
@@ -11740,7 +11740,7 @@
               </a:ln>
               <a:extLst>
                 <a:ext uri="{91240B29-F687-4f45-9708-019B960494DF}">
-                  <a14:hiddenLine xmlns:a14="http://schemas.microsoft.com/office/drawing/2010/main" xmlns="" w="9525">
+                  <a14:hiddenLine xmlns="" xmlns:a14="http://schemas.microsoft.com/office/drawing/2010/main" w="9525">
                     <a:solidFill>
                       <a:srgbClr val="000000"/>
                     </a:solidFill>
@@ -11805,7 +11805,7 @@
               </a:ln>
               <a:extLst>
                 <a:ext uri="{91240B29-F687-4f45-9708-019B960494DF}">
-                  <a14:hiddenLine xmlns:a14="http://schemas.microsoft.com/office/drawing/2010/main" xmlns="" w="9525">
+                  <a14:hiddenLine xmlns="" xmlns:a14="http://schemas.microsoft.com/office/drawing/2010/main" w="9525">
                     <a:solidFill>
                       <a:srgbClr val="000000"/>
                     </a:solidFill>
@@ -11895,7 +11895,7 @@
               </a:ln>
               <a:extLst>
                 <a:ext uri="{91240B29-F687-4f45-9708-019B960494DF}">
-                  <a14:hiddenLine xmlns:a14="http://schemas.microsoft.com/office/drawing/2010/main" xmlns="" w="9525">
+                  <a14:hiddenLine xmlns="" xmlns:a14="http://schemas.microsoft.com/office/drawing/2010/main" w="9525">
                     <a:solidFill>
                       <a:srgbClr val="000000"/>
                     </a:solidFill>
@@ -11963,7 +11963,7 @@
               </a:ln>
               <a:extLst>
                 <a:ext uri="{91240B29-F687-4f45-9708-019B960494DF}">
-                  <a14:hiddenLine xmlns:a14="http://schemas.microsoft.com/office/drawing/2010/main" xmlns="" w="9525">
+                  <a14:hiddenLine xmlns="" xmlns:a14="http://schemas.microsoft.com/office/drawing/2010/main" w="9525">
                     <a:solidFill>
                       <a:srgbClr val="000000"/>
                     </a:solidFill>
@@ -12053,7 +12053,7 @@
               </a:ln>
               <a:extLst>
                 <a:ext uri="{91240B29-F687-4f45-9708-019B960494DF}">
-                  <a14:hiddenLine xmlns:a14="http://schemas.microsoft.com/office/drawing/2010/main" xmlns="" w="9525">
+                  <a14:hiddenLine xmlns="" xmlns:a14="http://schemas.microsoft.com/office/drawing/2010/main" w="9525">
                     <a:solidFill>
                       <a:srgbClr val="000000"/>
                     </a:solidFill>
@@ -12121,7 +12121,7 @@
               </a:ln>
               <a:extLst>
                 <a:ext uri="{91240B29-F687-4f45-9708-019B960494DF}">
-                  <a14:hiddenLine xmlns:a14="http://schemas.microsoft.com/office/drawing/2010/main" xmlns="" w="9525">
+                  <a14:hiddenLine xmlns="" xmlns:a14="http://schemas.microsoft.com/office/drawing/2010/main" w="9525">
                     <a:solidFill>
                       <a:srgbClr val="000000"/>
                     </a:solidFill>
@@ -12211,7 +12211,7 @@
               </a:ln>
               <a:extLst>
                 <a:ext uri="{91240B29-F687-4f45-9708-019B960494DF}">
-                  <a14:hiddenLine xmlns:a14="http://schemas.microsoft.com/office/drawing/2010/main" xmlns="" w="9525">
+                  <a14:hiddenLine xmlns="" xmlns:a14="http://schemas.microsoft.com/office/drawing/2010/main" w="9525">
                     <a:solidFill>
                       <a:srgbClr val="000000"/>
                     </a:solidFill>
@@ -12245,7 +12245,7 @@
               </a:ln>
               <a:extLst>
                 <a:ext uri="{91240B29-F687-4f45-9708-019B960494DF}">
-                  <a14:hiddenLine xmlns:a14="http://schemas.microsoft.com/office/drawing/2010/main" xmlns="" w="9525">
+                  <a14:hiddenLine xmlns="" xmlns:a14="http://schemas.microsoft.com/office/drawing/2010/main" w="9525">
                     <a:solidFill>
                       <a:srgbClr val="000000"/>
                     </a:solidFill>
@@ -12385,7 +12385,7 @@
           <a:p>
             <a:fld id="{9C2E08F3-6ADB-4031-89E6-89707F5CDBB1}" type="datetime1">
               <a:rPr lang="en-US" smtClean="0"/>
-              <a:t>4/17/2025</a:t>
+              <a:t>4/18/2025</a:t>
             </a:fld>
             <a:endParaRPr lang="en-US" dirty="0"/>
           </a:p>
@@ -12916,7 +12916,7 @@
           <a:p>
             <a:fld id="{DEAE2368-4D5B-4100-AD00-D730DAA20AC8}" type="datetime1">
               <a:rPr lang="en-US" smtClean="0"/>
-              <a:t>4/17/2025</a:t>
+              <a:t>4/18/2025</a:t>
             </a:fld>
             <a:endParaRPr lang="en-US" dirty="0"/>
           </a:p>
@@ -13134,7 +13134,7 @@
                   <a:schemeClr val="bg1"/>
                 </a:solidFill>
               </a:rPr>
-              <a:t>4/17/2025</a:t>
+              <a:t>4/18/2025</a:t>
             </a:fld>
             <a:endParaRPr lang="en-US" dirty="0">
               <a:solidFill>
@@ -13257,7 +13257,9 @@
         </p:nvSpPr>
         <p:spPr/>
         <p:txBody>
-          <a:bodyPr/>
+          <a:bodyPr>
+            <a:normAutofit lnSpcReduction="10000"/>
+          </a:bodyPr>
           <a:lstStyle/>
           <a:p>
             <a:r>
@@ -13295,6 +13297,30 @@
                 <a:hlinkClick r:id="rId5"/>
               </a:rPr>
               <a:t>EU CRA Experts Group </a:t>
+            </a:r>
+            <a:endParaRPr lang="en-US" dirty="0"/>
+          </a:p>
+          <a:p>
+            <a:r>
+              <a:rPr lang="en-US" dirty="0" err="1">
+                <a:hlinkClick r:id="rId6"/>
+              </a:rPr>
+              <a:t>CISASAGReader</a:t>
+            </a:r>
+            <a:r>
+              <a:rPr lang="en-US" dirty="0">
+                <a:hlinkClick r:id="rId6"/>
+              </a:rPr>
+              <a:t> open source project with SCRM artifact examples</a:t>
+            </a:r>
+            <a:endParaRPr lang="en-US" dirty="0"/>
+          </a:p>
+          <a:p>
+            <a:r>
+              <a:rPr lang="en-US" dirty="0">
+                <a:hlinkClick r:id="rId7"/>
+              </a:rPr>
+              <a:t>NASA Guidance on SCRM best practices implemented by the US Government</a:t>
             </a:r>
             <a:endParaRPr lang="en-US" dirty="0"/>
           </a:p>
@@ -13323,7 +13349,7 @@
           <a:p>
             <a:fld id="{8EE2707C-063E-46D3-BE25-A9A8D80E43A6}" type="datetime1">
               <a:rPr lang="en-US" smtClean="0"/>
-              <a:t>4/17/2025</a:t>
+              <a:t>4/18/2025</a:t>
             </a:fld>
             <a:endParaRPr lang="en-US" dirty="0"/>
           </a:p>
@@ -13411,7 +13437,7 @@
           <a:p>
             <a:fld id="{8EE2707C-063E-46D3-BE25-A9A8D80E43A6}" type="datetime1">
               <a:rPr lang="en-US" smtClean="0"/>
-              <a:t>4/17/2025</a:t>
+              <a:t>4/18/2025</a:t>
             </a:fld>
             <a:endParaRPr lang="en-US" dirty="0"/>
           </a:p>

</xml_diff>